<commit_message>
Modificando figura do GetSubMatrix
</commit_message>
<xml_diff>
--- a/Outros/MestradoFiguras2.pptx
+++ b/Outros/MestradoFiguras2.pptx
@@ -156,10 +156,9 @@
           </a:lstStyle>
           <a:p>
             <a:r>
-              <a:rPr lang="pt-BR" smtClean="0"/>
+              <a:rPr lang="pt-BR"/>
               <a:t>Clique para editar o título mestre</a:t>
             </a:r>
-            <a:endParaRPr lang="pt-BR"/>
           </a:p>
         </p:txBody>
       </p:sp>
@@ -221,10 +220,9 @@
           </a:lstStyle>
           <a:p>
             <a:r>
-              <a:rPr lang="pt-BR" smtClean="0"/>
+              <a:rPr lang="pt-BR"/>
               <a:t>Clique para editar o estilo do subtítulo Mestre</a:t>
             </a:r>
-            <a:endParaRPr lang="pt-BR"/>
           </a:p>
         </p:txBody>
       </p:sp>
@@ -245,7 +243,7 @@
           <a:p>
             <a:fld id="{FD4AC941-A4D7-4DAA-81C3-DA9EA35F0F68}" type="datetimeFigureOut">
               <a:rPr lang="pt-BR" smtClean="0"/>
-              <a:t>28/02/2019</a:t>
+              <a:t>09/03/2019</a:t>
             </a:fld>
             <a:endParaRPr lang="pt-BR"/>
           </a:p>
@@ -287,7 +285,7 @@
           <a:p>
             <a:fld id="{581EE8FE-2ED7-4609-AFA7-8DD37B39FEBE}" type="slidenum">
               <a:rPr lang="pt-BR" smtClean="0"/>
-              <a:t>‹nº›</a:t>
+              <a:t>‹#›</a:t>
             </a:fld>
             <a:endParaRPr lang="pt-BR"/>
           </a:p>
@@ -339,10 +337,9 @@
           <a:lstStyle/>
           <a:p>
             <a:r>
-              <a:rPr lang="pt-BR" smtClean="0"/>
+              <a:rPr lang="pt-BR"/>
               <a:t>Clique para editar o título mestre</a:t>
             </a:r>
-            <a:endParaRPr lang="pt-BR"/>
           </a:p>
         </p:txBody>
       </p:sp>
@@ -363,38 +360,37 @@
           <a:p>
             <a:pPr lvl="0"/>
             <a:r>
-              <a:rPr lang="pt-BR" smtClean="0"/>
+              <a:rPr lang="pt-BR"/>
               <a:t>Editar estilos de texto Mestre</a:t>
             </a:r>
           </a:p>
           <a:p>
             <a:pPr lvl="1"/>
             <a:r>
-              <a:rPr lang="pt-BR" smtClean="0"/>
+              <a:rPr lang="pt-BR"/>
               <a:t>Segundo nível</a:t>
             </a:r>
           </a:p>
           <a:p>
             <a:pPr lvl="2"/>
             <a:r>
-              <a:rPr lang="pt-BR" smtClean="0"/>
+              <a:rPr lang="pt-BR"/>
               <a:t>Terceiro nível</a:t>
             </a:r>
           </a:p>
           <a:p>
             <a:pPr lvl="3"/>
             <a:r>
-              <a:rPr lang="pt-BR" smtClean="0"/>
+              <a:rPr lang="pt-BR"/>
               <a:t>Quarto nível</a:t>
             </a:r>
           </a:p>
           <a:p>
             <a:pPr lvl="4"/>
             <a:r>
-              <a:rPr lang="pt-BR" smtClean="0"/>
+              <a:rPr lang="pt-BR"/>
               <a:t>Quinto nível</a:t>
             </a:r>
-            <a:endParaRPr lang="pt-BR"/>
           </a:p>
         </p:txBody>
       </p:sp>
@@ -415,7 +411,7 @@
           <a:p>
             <a:fld id="{FD4AC941-A4D7-4DAA-81C3-DA9EA35F0F68}" type="datetimeFigureOut">
               <a:rPr lang="pt-BR" smtClean="0"/>
-              <a:t>28/02/2019</a:t>
+              <a:t>09/03/2019</a:t>
             </a:fld>
             <a:endParaRPr lang="pt-BR"/>
           </a:p>
@@ -457,7 +453,7 @@
           <a:p>
             <a:fld id="{581EE8FE-2ED7-4609-AFA7-8DD37B39FEBE}" type="slidenum">
               <a:rPr lang="pt-BR" smtClean="0"/>
-              <a:t>‹nº›</a:t>
+              <a:t>‹#›</a:t>
             </a:fld>
             <a:endParaRPr lang="pt-BR"/>
           </a:p>
@@ -514,10 +510,9 @@
           <a:lstStyle/>
           <a:p>
             <a:r>
-              <a:rPr lang="pt-BR" smtClean="0"/>
+              <a:rPr lang="pt-BR"/>
               <a:t>Clique para editar o título mestre</a:t>
             </a:r>
-            <a:endParaRPr lang="pt-BR"/>
           </a:p>
         </p:txBody>
       </p:sp>
@@ -543,38 +538,37 @@
           <a:p>
             <a:pPr lvl="0"/>
             <a:r>
-              <a:rPr lang="pt-BR" smtClean="0"/>
+              <a:rPr lang="pt-BR"/>
               <a:t>Editar estilos de texto Mestre</a:t>
             </a:r>
           </a:p>
           <a:p>
             <a:pPr lvl="1"/>
             <a:r>
-              <a:rPr lang="pt-BR" smtClean="0"/>
+              <a:rPr lang="pt-BR"/>
               <a:t>Segundo nível</a:t>
             </a:r>
           </a:p>
           <a:p>
             <a:pPr lvl="2"/>
             <a:r>
-              <a:rPr lang="pt-BR" smtClean="0"/>
+              <a:rPr lang="pt-BR"/>
               <a:t>Terceiro nível</a:t>
             </a:r>
           </a:p>
           <a:p>
             <a:pPr lvl="3"/>
             <a:r>
-              <a:rPr lang="pt-BR" smtClean="0"/>
+              <a:rPr lang="pt-BR"/>
               <a:t>Quarto nível</a:t>
             </a:r>
           </a:p>
           <a:p>
             <a:pPr lvl="4"/>
             <a:r>
-              <a:rPr lang="pt-BR" smtClean="0"/>
+              <a:rPr lang="pt-BR"/>
               <a:t>Quinto nível</a:t>
             </a:r>
-            <a:endParaRPr lang="pt-BR"/>
           </a:p>
         </p:txBody>
       </p:sp>
@@ -595,7 +589,7 @@
           <a:p>
             <a:fld id="{FD4AC941-A4D7-4DAA-81C3-DA9EA35F0F68}" type="datetimeFigureOut">
               <a:rPr lang="pt-BR" smtClean="0"/>
-              <a:t>28/02/2019</a:t>
+              <a:t>09/03/2019</a:t>
             </a:fld>
             <a:endParaRPr lang="pt-BR"/>
           </a:p>
@@ -637,7 +631,7 @@
           <a:p>
             <a:fld id="{581EE8FE-2ED7-4609-AFA7-8DD37B39FEBE}" type="slidenum">
               <a:rPr lang="pt-BR" smtClean="0"/>
-              <a:t>‹nº›</a:t>
+              <a:t>‹#›</a:t>
             </a:fld>
             <a:endParaRPr lang="pt-BR"/>
           </a:p>
@@ -689,10 +683,9 @@
           <a:lstStyle/>
           <a:p>
             <a:r>
-              <a:rPr lang="pt-BR" smtClean="0"/>
+              <a:rPr lang="pt-BR"/>
               <a:t>Clique para editar o título mestre</a:t>
             </a:r>
-            <a:endParaRPr lang="pt-BR"/>
           </a:p>
         </p:txBody>
       </p:sp>
@@ -713,38 +706,37 @@
           <a:p>
             <a:pPr lvl="0"/>
             <a:r>
-              <a:rPr lang="pt-BR" smtClean="0"/>
+              <a:rPr lang="pt-BR"/>
               <a:t>Editar estilos de texto Mestre</a:t>
             </a:r>
           </a:p>
           <a:p>
             <a:pPr lvl="1"/>
             <a:r>
-              <a:rPr lang="pt-BR" smtClean="0"/>
+              <a:rPr lang="pt-BR"/>
               <a:t>Segundo nível</a:t>
             </a:r>
           </a:p>
           <a:p>
             <a:pPr lvl="2"/>
             <a:r>
-              <a:rPr lang="pt-BR" smtClean="0"/>
+              <a:rPr lang="pt-BR"/>
               <a:t>Terceiro nível</a:t>
             </a:r>
           </a:p>
           <a:p>
             <a:pPr lvl="3"/>
             <a:r>
-              <a:rPr lang="pt-BR" smtClean="0"/>
+              <a:rPr lang="pt-BR"/>
               <a:t>Quarto nível</a:t>
             </a:r>
           </a:p>
           <a:p>
             <a:pPr lvl="4"/>
             <a:r>
-              <a:rPr lang="pt-BR" smtClean="0"/>
+              <a:rPr lang="pt-BR"/>
               <a:t>Quinto nível</a:t>
             </a:r>
-            <a:endParaRPr lang="pt-BR"/>
           </a:p>
         </p:txBody>
       </p:sp>
@@ -765,7 +757,7 @@
           <a:p>
             <a:fld id="{FD4AC941-A4D7-4DAA-81C3-DA9EA35F0F68}" type="datetimeFigureOut">
               <a:rPr lang="pt-BR" smtClean="0"/>
-              <a:t>28/02/2019</a:t>
+              <a:t>09/03/2019</a:t>
             </a:fld>
             <a:endParaRPr lang="pt-BR"/>
           </a:p>
@@ -807,7 +799,7 @@
           <a:p>
             <a:fld id="{581EE8FE-2ED7-4609-AFA7-8DD37B39FEBE}" type="slidenum">
               <a:rPr lang="pt-BR" smtClean="0"/>
-              <a:t>‹nº›</a:t>
+              <a:t>‹#›</a:t>
             </a:fld>
             <a:endParaRPr lang="pt-BR"/>
           </a:p>
@@ -868,10 +860,9 @@
           </a:lstStyle>
           <a:p>
             <a:r>
-              <a:rPr lang="pt-BR" smtClean="0"/>
+              <a:rPr lang="pt-BR"/>
               <a:t>Clique para editar o título mestre</a:t>
             </a:r>
-            <a:endParaRPr lang="pt-BR"/>
           </a:p>
         </p:txBody>
       </p:sp>
@@ -988,7 +979,7 @@
           <a:p>
             <a:pPr lvl="0"/>
             <a:r>
-              <a:rPr lang="pt-BR" smtClean="0"/>
+              <a:rPr lang="pt-BR"/>
               <a:t>Editar estilos de texto Mestre</a:t>
             </a:r>
           </a:p>
@@ -1011,7 +1002,7 @@
           <a:p>
             <a:fld id="{FD4AC941-A4D7-4DAA-81C3-DA9EA35F0F68}" type="datetimeFigureOut">
               <a:rPr lang="pt-BR" smtClean="0"/>
-              <a:t>28/02/2019</a:t>
+              <a:t>09/03/2019</a:t>
             </a:fld>
             <a:endParaRPr lang="pt-BR"/>
           </a:p>
@@ -1053,7 +1044,7 @@
           <a:p>
             <a:fld id="{581EE8FE-2ED7-4609-AFA7-8DD37B39FEBE}" type="slidenum">
               <a:rPr lang="pt-BR" smtClean="0"/>
-              <a:t>‹nº›</a:t>
+              <a:t>‹#›</a:t>
             </a:fld>
             <a:endParaRPr lang="pt-BR"/>
           </a:p>
@@ -1105,10 +1096,9 @@
           <a:lstStyle/>
           <a:p>
             <a:r>
-              <a:rPr lang="pt-BR" smtClean="0"/>
+              <a:rPr lang="pt-BR"/>
               <a:t>Clique para editar o título mestre</a:t>
             </a:r>
-            <a:endParaRPr lang="pt-BR"/>
           </a:p>
         </p:txBody>
       </p:sp>
@@ -1134,38 +1124,37 @@
           <a:p>
             <a:pPr lvl="0"/>
             <a:r>
-              <a:rPr lang="pt-BR" smtClean="0"/>
+              <a:rPr lang="pt-BR"/>
               <a:t>Editar estilos de texto Mestre</a:t>
             </a:r>
           </a:p>
           <a:p>
             <a:pPr lvl="1"/>
             <a:r>
-              <a:rPr lang="pt-BR" smtClean="0"/>
+              <a:rPr lang="pt-BR"/>
               <a:t>Segundo nível</a:t>
             </a:r>
           </a:p>
           <a:p>
             <a:pPr lvl="2"/>
             <a:r>
-              <a:rPr lang="pt-BR" smtClean="0"/>
+              <a:rPr lang="pt-BR"/>
               <a:t>Terceiro nível</a:t>
             </a:r>
           </a:p>
           <a:p>
             <a:pPr lvl="3"/>
             <a:r>
-              <a:rPr lang="pt-BR" smtClean="0"/>
+              <a:rPr lang="pt-BR"/>
               <a:t>Quarto nível</a:t>
             </a:r>
           </a:p>
           <a:p>
             <a:pPr lvl="4"/>
             <a:r>
-              <a:rPr lang="pt-BR" smtClean="0"/>
+              <a:rPr lang="pt-BR"/>
               <a:t>Quinto nível</a:t>
             </a:r>
-            <a:endParaRPr lang="pt-BR"/>
           </a:p>
         </p:txBody>
       </p:sp>
@@ -1191,38 +1180,37 @@
           <a:p>
             <a:pPr lvl="0"/>
             <a:r>
-              <a:rPr lang="pt-BR" smtClean="0"/>
+              <a:rPr lang="pt-BR"/>
               <a:t>Editar estilos de texto Mestre</a:t>
             </a:r>
           </a:p>
           <a:p>
             <a:pPr lvl="1"/>
             <a:r>
-              <a:rPr lang="pt-BR" smtClean="0"/>
+              <a:rPr lang="pt-BR"/>
               <a:t>Segundo nível</a:t>
             </a:r>
           </a:p>
           <a:p>
             <a:pPr lvl="2"/>
             <a:r>
-              <a:rPr lang="pt-BR" smtClean="0"/>
+              <a:rPr lang="pt-BR"/>
               <a:t>Terceiro nível</a:t>
             </a:r>
           </a:p>
           <a:p>
             <a:pPr lvl="3"/>
             <a:r>
-              <a:rPr lang="pt-BR" smtClean="0"/>
+              <a:rPr lang="pt-BR"/>
               <a:t>Quarto nível</a:t>
             </a:r>
           </a:p>
           <a:p>
             <a:pPr lvl="4"/>
             <a:r>
-              <a:rPr lang="pt-BR" smtClean="0"/>
+              <a:rPr lang="pt-BR"/>
               <a:t>Quinto nível</a:t>
             </a:r>
-            <a:endParaRPr lang="pt-BR"/>
           </a:p>
         </p:txBody>
       </p:sp>
@@ -1243,7 +1231,7 @@
           <a:p>
             <a:fld id="{FD4AC941-A4D7-4DAA-81C3-DA9EA35F0F68}" type="datetimeFigureOut">
               <a:rPr lang="pt-BR" smtClean="0"/>
-              <a:t>28/02/2019</a:t>
+              <a:t>09/03/2019</a:t>
             </a:fld>
             <a:endParaRPr lang="pt-BR"/>
           </a:p>
@@ -1285,7 +1273,7 @@
           <a:p>
             <a:fld id="{581EE8FE-2ED7-4609-AFA7-8DD37B39FEBE}" type="slidenum">
               <a:rPr lang="pt-BR" smtClean="0"/>
-              <a:t>‹nº›</a:t>
+              <a:t>‹#›</a:t>
             </a:fld>
             <a:endParaRPr lang="pt-BR"/>
           </a:p>
@@ -1342,10 +1330,9 @@
           <a:lstStyle/>
           <a:p>
             <a:r>
-              <a:rPr lang="pt-BR" smtClean="0"/>
+              <a:rPr lang="pt-BR"/>
               <a:t>Clique para editar o título mestre</a:t>
             </a:r>
-            <a:endParaRPr lang="pt-BR"/>
           </a:p>
         </p:txBody>
       </p:sp>
@@ -1408,7 +1395,7 @@
           <a:p>
             <a:pPr lvl="0"/>
             <a:r>
-              <a:rPr lang="pt-BR" smtClean="0"/>
+              <a:rPr lang="pt-BR"/>
               <a:t>Editar estilos de texto Mestre</a:t>
             </a:r>
           </a:p>
@@ -1436,38 +1423,37 @@
           <a:p>
             <a:pPr lvl="0"/>
             <a:r>
-              <a:rPr lang="pt-BR" smtClean="0"/>
+              <a:rPr lang="pt-BR"/>
               <a:t>Editar estilos de texto Mestre</a:t>
             </a:r>
           </a:p>
           <a:p>
             <a:pPr lvl="1"/>
             <a:r>
-              <a:rPr lang="pt-BR" smtClean="0"/>
+              <a:rPr lang="pt-BR"/>
               <a:t>Segundo nível</a:t>
             </a:r>
           </a:p>
           <a:p>
             <a:pPr lvl="2"/>
             <a:r>
-              <a:rPr lang="pt-BR" smtClean="0"/>
+              <a:rPr lang="pt-BR"/>
               <a:t>Terceiro nível</a:t>
             </a:r>
           </a:p>
           <a:p>
             <a:pPr lvl="3"/>
             <a:r>
-              <a:rPr lang="pt-BR" smtClean="0"/>
+              <a:rPr lang="pt-BR"/>
               <a:t>Quarto nível</a:t>
             </a:r>
           </a:p>
           <a:p>
             <a:pPr lvl="4"/>
             <a:r>
-              <a:rPr lang="pt-BR" smtClean="0"/>
+              <a:rPr lang="pt-BR"/>
               <a:t>Quinto nível</a:t>
             </a:r>
-            <a:endParaRPr lang="pt-BR"/>
           </a:p>
         </p:txBody>
       </p:sp>
@@ -1530,7 +1516,7 @@
           <a:p>
             <a:pPr lvl="0"/>
             <a:r>
-              <a:rPr lang="pt-BR" smtClean="0"/>
+              <a:rPr lang="pt-BR"/>
               <a:t>Editar estilos de texto Mestre</a:t>
             </a:r>
           </a:p>
@@ -1558,38 +1544,37 @@
           <a:p>
             <a:pPr lvl="0"/>
             <a:r>
-              <a:rPr lang="pt-BR" smtClean="0"/>
+              <a:rPr lang="pt-BR"/>
               <a:t>Editar estilos de texto Mestre</a:t>
             </a:r>
           </a:p>
           <a:p>
             <a:pPr lvl="1"/>
             <a:r>
-              <a:rPr lang="pt-BR" smtClean="0"/>
+              <a:rPr lang="pt-BR"/>
               <a:t>Segundo nível</a:t>
             </a:r>
           </a:p>
           <a:p>
             <a:pPr lvl="2"/>
             <a:r>
-              <a:rPr lang="pt-BR" smtClean="0"/>
+              <a:rPr lang="pt-BR"/>
               <a:t>Terceiro nível</a:t>
             </a:r>
           </a:p>
           <a:p>
             <a:pPr lvl="3"/>
             <a:r>
-              <a:rPr lang="pt-BR" smtClean="0"/>
+              <a:rPr lang="pt-BR"/>
               <a:t>Quarto nível</a:t>
             </a:r>
           </a:p>
           <a:p>
             <a:pPr lvl="4"/>
             <a:r>
-              <a:rPr lang="pt-BR" smtClean="0"/>
+              <a:rPr lang="pt-BR"/>
               <a:t>Quinto nível</a:t>
             </a:r>
-            <a:endParaRPr lang="pt-BR"/>
           </a:p>
         </p:txBody>
       </p:sp>
@@ -1610,7 +1595,7 @@
           <a:p>
             <a:fld id="{FD4AC941-A4D7-4DAA-81C3-DA9EA35F0F68}" type="datetimeFigureOut">
               <a:rPr lang="pt-BR" smtClean="0"/>
-              <a:t>28/02/2019</a:t>
+              <a:t>09/03/2019</a:t>
             </a:fld>
             <a:endParaRPr lang="pt-BR"/>
           </a:p>
@@ -1652,7 +1637,7 @@
           <a:p>
             <a:fld id="{581EE8FE-2ED7-4609-AFA7-8DD37B39FEBE}" type="slidenum">
               <a:rPr lang="pt-BR" smtClean="0"/>
-              <a:t>‹nº›</a:t>
+              <a:t>‹#›</a:t>
             </a:fld>
             <a:endParaRPr lang="pt-BR"/>
           </a:p>
@@ -1704,10 +1689,9 @@
           <a:lstStyle/>
           <a:p>
             <a:r>
-              <a:rPr lang="pt-BR" smtClean="0"/>
+              <a:rPr lang="pt-BR"/>
               <a:t>Clique para editar o título mestre</a:t>
             </a:r>
-            <a:endParaRPr lang="pt-BR"/>
           </a:p>
         </p:txBody>
       </p:sp>
@@ -1728,7 +1712,7 @@
           <a:p>
             <a:fld id="{FD4AC941-A4D7-4DAA-81C3-DA9EA35F0F68}" type="datetimeFigureOut">
               <a:rPr lang="pt-BR" smtClean="0"/>
-              <a:t>28/02/2019</a:t>
+              <a:t>09/03/2019</a:t>
             </a:fld>
             <a:endParaRPr lang="pt-BR"/>
           </a:p>
@@ -1770,7 +1754,7 @@
           <a:p>
             <a:fld id="{581EE8FE-2ED7-4609-AFA7-8DD37B39FEBE}" type="slidenum">
               <a:rPr lang="pt-BR" smtClean="0"/>
-              <a:t>‹nº›</a:t>
+              <a:t>‹#›</a:t>
             </a:fld>
             <a:endParaRPr lang="pt-BR"/>
           </a:p>
@@ -1823,7 +1807,7 @@
           <a:p>
             <a:fld id="{FD4AC941-A4D7-4DAA-81C3-DA9EA35F0F68}" type="datetimeFigureOut">
               <a:rPr lang="pt-BR" smtClean="0"/>
-              <a:t>28/02/2019</a:t>
+              <a:t>09/03/2019</a:t>
             </a:fld>
             <a:endParaRPr lang="pt-BR"/>
           </a:p>
@@ -1865,7 +1849,7 @@
           <a:p>
             <a:fld id="{581EE8FE-2ED7-4609-AFA7-8DD37B39FEBE}" type="slidenum">
               <a:rPr lang="pt-BR" smtClean="0"/>
-              <a:t>‹nº›</a:t>
+              <a:t>‹#›</a:t>
             </a:fld>
             <a:endParaRPr lang="pt-BR"/>
           </a:p>
@@ -1926,10 +1910,9 @@
           </a:lstStyle>
           <a:p>
             <a:r>
-              <a:rPr lang="pt-BR" smtClean="0"/>
+              <a:rPr lang="pt-BR"/>
               <a:t>Clique para editar o título mestre</a:t>
             </a:r>
-            <a:endParaRPr lang="pt-BR"/>
           </a:p>
         </p:txBody>
       </p:sp>
@@ -1983,38 +1966,37 @@
           <a:p>
             <a:pPr lvl="0"/>
             <a:r>
-              <a:rPr lang="pt-BR" smtClean="0"/>
+              <a:rPr lang="pt-BR"/>
               <a:t>Editar estilos de texto Mestre</a:t>
             </a:r>
           </a:p>
           <a:p>
             <a:pPr lvl="1"/>
             <a:r>
-              <a:rPr lang="pt-BR" smtClean="0"/>
+              <a:rPr lang="pt-BR"/>
               <a:t>Segundo nível</a:t>
             </a:r>
           </a:p>
           <a:p>
             <a:pPr lvl="2"/>
             <a:r>
-              <a:rPr lang="pt-BR" smtClean="0"/>
+              <a:rPr lang="pt-BR"/>
               <a:t>Terceiro nível</a:t>
             </a:r>
           </a:p>
           <a:p>
             <a:pPr lvl="3"/>
             <a:r>
-              <a:rPr lang="pt-BR" smtClean="0"/>
+              <a:rPr lang="pt-BR"/>
               <a:t>Quarto nível</a:t>
             </a:r>
           </a:p>
           <a:p>
             <a:pPr lvl="4"/>
             <a:r>
-              <a:rPr lang="pt-BR" smtClean="0"/>
+              <a:rPr lang="pt-BR"/>
               <a:t>Quinto nível</a:t>
             </a:r>
-            <a:endParaRPr lang="pt-BR"/>
           </a:p>
         </p:txBody>
       </p:sp>
@@ -2077,7 +2059,7 @@
           <a:p>
             <a:pPr lvl="0"/>
             <a:r>
-              <a:rPr lang="pt-BR" smtClean="0"/>
+              <a:rPr lang="pt-BR"/>
               <a:t>Editar estilos de texto Mestre</a:t>
             </a:r>
           </a:p>
@@ -2100,7 +2082,7 @@
           <a:p>
             <a:fld id="{FD4AC941-A4D7-4DAA-81C3-DA9EA35F0F68}" type="datetimeFigureOut">
               <a:rPr lang="pt-BR" smtClean="0"/>
-              <a:t>28/02/2019</a:t>
+              <a:t>09/03/2019</a:t>
             </a:fld>
             <a:endParaRPr lang="pt-BR"/>
           </a:p>
@@ -2142,7 +2124,7 @@
           <a:p>
             <a:fld id="{581EE8FE-2ED7-4609-AFA7-8DD37B39FEBE}" type="slidenum">
               <a:rPr lang="pt-BR" smtClean="0"/>
-              <a:t>‹nº›</a:t>
+              <a:t>‹#›</a:t>
             </a:fld>
             <a:endParaRPr lang="pt-BR"/>
           </a:p>
@@ -2203,10 +2185,9 @@
           </a:lstStyle>
           <a:p>
             <a:r>
-              <a:rPr lang="pt-BR" smtClean="0"/>
+              <a:rPr lang="pt-BR"/>
               <a:t>Clique para editar o título mestre</a:t>
             </a:r>
-            <a:endParaRPr lang="pt-BR"/>
           </a:p>
         </p:txBody>
       </p:sp>
@@ -2330,7 +2311,7 @@
           <a:p>
             <a:pPr lvl="0"/>
             <a:r>
-              <a:rPr lang="pt-BR" smtClean="0"/>
+              <a:rPr lang="pt-BR"/>
               <a:t>Editar estilos de texto Mestre</a:t>
             </a:r>
           </a:p>
@@ -2353,7 +2334,7 @@
           <a:p>
             <a:fld id="{FD4AC941-A4D7-4DAA-81C3-DA9EA35F0F68}" type="datetimeFigureOut">
               <a:rPr lang="pt-BR" smtClean="0"/>
-              <a:t>28/02/2019</a:t>
+              <a:t>09/03/2019</a:t>
             </a:fld>
             <a:endParaRPr lang="pt-BR"/>
           </a:p>
@@ -2395,7 +2376,7 @@
           <a:p>
             <a:fld id="{581EE8FE-2ED7-4609-AFA7-8DD37B39FEBE}" type="slidenum">
               <a:rPr lang="pt-BR" smtClean="0"/>
-              <a:t>‹nº›</a:t>
+              <a:t>‹#›</a:t>
             </a:fld>
             <a:endParaRPr lang="pt-BR"/>
           </a:p>
@@ -2462,10 +2443,9 @@
           <a:lstStyle/>
           <a:p>
             <a:r>
-              <a:rPr lang="pt-BR" smtClean="0"/>
+              <a:rPr lang="pt-BR"/>
               <a:t>Clique para editar o título mestre</a:t>
             </a:r>
-            <a:endParaRPr lang="pt-BR"/>
           </a:p>
         </p:txBody>
       </p:sp>
@@ -2496,38 +2476,37 @@
           <a:p>
             <a:pPr lvl="0"/>
             <a:r>
-              <a:rPr lang="pt-BR" smtClean="0"/>
+              <a:rPr lang="pt-BR"/>
               <a:t>Editar estilos de texto Mestre</a:t>
             </a:r>
           </a:p>
           <a:p>
             <a:pPr lvl="1"/>
             <a:r>
-              <a:rPr lang="pt-BR" smtClean="0"/>
+              <a:rPr lang="pt-BR"/>
               <a:t>Segundo nível</a:t>
             </a:r>
           </a:p>
           <a:p>
             <a:pPr lvl="2"/>
             <a:r>
-              <a:rPr lang="pt-BR" smtClean="0"/>
+              <a:rPr lang="pt-BR"/>
               <a:t>Terceiro nível</a:t>
             </a:r>
           </a:p>
           <a:p>
             <a:pPr lvl="3"/>
             <a:r>
-              <a:rPr lang="pt-BR" smtClean="0"/>
+              <a:rPr lang="pt-BR"/>
               <a:t>Quarto nível</a:t>
             </a:r>
           </a:p>
           <a:p>
             <a:pPr lvl="4"/>
             <a:r>
-              <a:rPr lang="pt-BR" smtClean="0"/>
+              <a:rPr lang="pt-BR"/>
               <a:t>Quinto nível</a:t>
             </a:r>
-            <a:endParaRPr lang="pt-BR"/>
           </a:p>
         </p:txBody>
       </p:sp>
@@ -2566,7 +2545,7 @@
           <a:p>
             <a:fld id="{FD4AC941-A4D7-4DAA-81C3-DA9EA35F0F68}" type="datetimeFigureOut">
               <a:rPr lang="pt-BR" smtClean="0"/>
-              <a:t>28/02/2019</a:t>
+              <a:t>09/03/2019</a:t>
             </a:fld>
             <a:endParaRPr lang="pt-BR"/>
           </a:p>
@@ -2644,7 +2623,7 @@
           <a:p>
             <a:fld id="{581EE8FE-2ED7-4609-AFA7-8DD37B39FEBE}" type="slidenum">
               <a:rPr lang="pt-BR" smtClean="0"/>
-              <a:t>‹nº›</a:t>
+              <a:t>‹#›</a:t>
             </a:fld>
             <a:endParaRPr lang="pt-BR"/>
           </a:p>
@@ -12420,22 +12399,22 @@
           <a:p>
             <a:pPr algn="ctr"/>
             <a:r>
-              <a:rPr lang="pt-BR" dirty="0" smtClean="0"/>
+              <a:rPr lang="pt-BR" dirty="0"/>
               <a:t>Construção </a:t>
             </a:r>
           </a:p>
           <a:p>
             <a:pPr algn="ctr"/>
-            <a:endParaRPr lang="pt-BR" dirty="0" smtClean="0"/>
+            <a:endParaRPr lang="pt-BR" dirty="0"/>
           </a:p>
           <a:p>
             <a:pPr algn="ctr"/>
-            <a:endParaRPr lang="pt-BR" dirty="0" smtClean="0"/>
+            <a:endParaRPr lang="pt-BR" dirty="0"/>
           </a:p>
           <a:p>
             <a:pPr algn="ctr"/>
             <a:r>
-              <a:rPr lang="pt-BR" dirty="0" smtClean="0"/>
+              <a:rPr lang="pt-BR" dirty="0"/>
               <a:t>dos </a:t>
             </a:r>
             <a:r>
@@ -12444,13 +12423,8 @@
             </a:r>
             <a:r>
               <a:rPr lang="pt-BR" dirty="0"/>
-              <a:t> </a:t>
+              <a:t> dos problemas locais</a:t>
             </a:r>
-            <a:r>
-              <a:rPr lang="pt-BR" dirty="0" smtClean="0"/>
-              <a:t>dos problemas locais</a:t>
-            </a:r>
-            <a:endParaRPr lang="pt-BR" dirty="0"/>
           </a:p>
         </p:txBody>
       </p:sp>
@@ -12741,7 +12715,7 @@
           <a:p>
             <a:pPr algn="ctr"/>
             <a:r>
-              <a:rPr lang="pt-BR" dirty="0" smtClean="0"/>
+              <a:rPr lang="pt-BR" dirty="0"/>
               <a:t>Solução dos Problemas locais</a:t>
             </a:r>
           </a:p>
@@ -12774,13 +12748,8 @@
             </a:r>
             <a:r>
               <a:rPr lang="pt-BR" sz="1200" dirty="0"/>
-              <a:t> </a:t>
+              <a:t> 1</a:t>
             </a:r>
-            <a:r>
-              <a:rPr lang="pt-BR" sz="1200" dirty="0" smtClean="0"/>
-              <a:t>1</a:t>
-            </a:r>
-            <a:endParaRPr lang="pt-BR" sz="1200" dirty="0"/>
           </a:p>
         </p:txBody>
       </p:sp>
@@ -12811,13 +12780,8 @@
             </a:r>
             <a:r>
               <a:rPr lang="pt-BR" sz="1200" dirty="0"/>
-              <a:t> </a:t>
+              <a:t> 2</a:t>
             </a:r>
-            <a:r>
-              <a:rPr lang="pt-BR" sz="1200" dirty="0" smtClean="0"/>
-              <a:t>2</a:t>
-            </a:r>
-            <a:endParaRPr lang="pt-BR" sz="1200" dirty="0"/>
           </a:p>
         </p:txBody>
       </p:sp>
@@ -12848,13 +12812,8 @@
             </a:r>
             <a:r>
               <a:rPr lang="pt-BR" sz="1200" dirty="0"/>
-              <a:t> </a:t>
+              <a:t> 3</a:t>
             </a:r>
-            <a:r>
-              <a:rPr lang="pt-BR" sz="1200" dirty="0" smtClean="0"/>
-              <a:t>3</a:t>
-            </a:r>
-            <a:endParaRPr lang="pt-BR" sz="1200" dirty="0"/>
           </a:p>
         </p:txBody>
       </p:sp>
@@ -12880,14 +12839,13 @@
           <a:lstStyle/>
           <a:p>
             <a:r>
-              <a:rPr lang="pt-BR" sz="1200" dirty="0" err="1" smtClean="0"/>
+              <a:rPr lang="pt-BR" sz="1200" dirty="0" err="1"/>
               <a:t>FemContext</a:t>
             </a:r>
             <a:r>
-              <a:rPr lang="pt-BR" sz="1200" dirty="0" smtClean="0"/>
+              <a:rPr lang="pt-BR" sz="1200" dirty="0"/>
               <a:t> 4</a:t>
             </a:r>
-            <a:endParaRPr lang="pt-BR" sz="1200" dirty="0"/>
           </a:p>
         </p:txBody>
       </p:sp>
@@ -12931,8 +12889,8 @@
           </a:p>
         </p:txBody>
       </p:sp>
-      <mc:AlternateContent xmlns:mc="http://schemas.openxmlformats.org/markup-compatibility/2006">
-        <mc:Choice xmlns:a14="http://schemas.microsoft.com/office/drawing/2010/main" Requires="a14">
+      <mc:AlternateContent xmlns:mc="http://schemas.openxmlformats.org/markup-compatibility/2006" xmlns:a14="http://schemas.microsoft.com/office/drawing/2010/main">
+        <mc:Choice Requires="a14">
           <p:sp>
             <p:nvSpPr>
               <p:cNvPr id="21" name="CaixaDeTexto 20"/>
@@ -13018,7 +12976,7 @@
                   </m:oMath>
                 </a14:m>
                 <a:r>
-                  <a:rPr lang="pt-BR" sz="1600" dirty="0" smtClean="0"/>
+                  <a:rPr lang="pt-BR" sz="1600" dirty="0"/>
                   <a:t>, </a:t>
                 </a:r>
                 <a14:m>
@@ -13078,7 +13036,7 @@
                   </m:oMath>
                 </a14:m>
                 <a:r>
-                  <a:rPr lang="pt-BR" sz="1600" dirty="0" smtClean="0"/>
+                  <a:rPr lang="pt-BR" sz="1600" dirty="0"/>
                   <a:t>, ..., </a:t>
                 </a:r>
                 <a14:m>
@@ -13138,15 +13096,14 @@
                   </m:oMath>
                 </a14:m>
                 <a:r>
-                  <a:rPr lang="pt-BR" sz="1600" dirty="0" smtClean="0"/>
+                  <a:rPr lang="pt-BR" sz="1600" dirty="0"/>
                   <a:t>]</a:t>
                 </a:r>
-                <a:endParaRPr lang="pt-BR" sz="1600" dirty="0"/>
               </a:p>
             </p:txBody>
           </p:sp>
         </mc:Choice>
-        <mc:Fallback>
+        <mc:Fallback xmlns="">
           <p:sp>
             <p:nvSpPr>
               <p:cNvPr id="21" name="CaixaDeTexto 20"/>
@@ -13185,8 +13142,8 @@
           </p:sp>
         </mc:Fallback>
       </mc:AlternateContent>
-      <mc:AlternateContent xmlns:mc="http://schemas.openxmlformats.org/markup-compatibility/2006">
-        <mc:Choice xmlns:a14="http://schemas.microsoft.com/office/drawing/2010/main" Requires="a14">
+      <mc:AlternateContent xmlns:mc="http://schemas.openxmlformats.org/markup-compatibility/2006" xmlns:a14="http://schemas.microsoft.com/office/drawing/2010/main">
+        <mc:Choice Requires="a14">
           <p:sp>
             <p:nvSpPr>
               <p:cNvPr id="22" name="CaixaDeTexto 21"/>
@@ -13272,7 +13229,7 @@
                   </m:oMath>
                 </a14:m>
                 <a:r>
-                  <a:rPr lang="pt-BR" sz="1600" dirty="0" smtClean="0"/>
+                  <a:rPr lang="pt-BR" sz="1600" dirty="0"/>
                   <a:t>, </a:t>
                 </a:r>
                 <a14:m>
@@ -13332,7 +13289,7 @@
                   </m:oMath>
                 </a14:m>
                 <a:r>
-                  <a:rPr lang="pt-BR" sz="1600" dirty="0" smtClean="0"/>
+                  <a:rPr lang="pt-BR" sz="1600" dirty="0"/>
                   <a:t>, ..., </a:t>
                 </a:r>
                 <a14:m>
@@ -13392,15 +13349,14 @@
                   </m:oMath>
                 </a14:m>
                 <a:r>
-                  <a:rPr lang="pt-BR" sz="1600" dirty="0" smtClean="0"/>
+                  <a:rPr lang="pt-BR" sz="1600" dirty="0"/>
                   <a:t>]</a:t>
                 </a:r>
-                <a:endParaRPr lang="pt-BR" sz="1600" dirty="0"/>
               </a:p>
             </p:txBody>
           </p:sp>
         </mc:Choice>
-        <mc:Fallback>
+        <mc:Fallback xmlns="">
           <p:sp>
             <p:nvSpPr>
               <p:cNvPr id="22" name="CaixaDeTexto 21"/>
@@ -13439,8 +13395,8 @@
           </p:sp>
         </mc:Fallback>
       </mc:AlternateContent>
-      <mc:AlternateContent xmlns:mc="http://schemas.openxmlformats.org/markup-compatibility/2006">
-        <mc:Choice xmlns:a14="http://schemas.microsoft.com/office/drawing/2010/main" Requires="a14">
+      <mc:AlternateContent xmlns:mc="http://schemas.openxmlformats.org/markup-compatibility/2006" xmlns:a14="http://schemas.microsoft.com/office/drawing/2010/main">
+        <mc:Choice Requires="a14">
           <p:sp>
             <p:nvSpPr>
               <p:cNvPr id="23" name="CaixaDeTexto 22"/>
@@ -13526,7 +13482,7 @@
                   </m:oMath>
                 </a14:m>
                 <a:r>
-                  <a:rPr lang="pt-BR" sz="1600" dirty="0" smtClean="0"/>
+                  <a:rPr lang="pt-BR" sz="1600" dirty="0"/>
                   <a:t>, </a:t>
                 </a:r>
                 <a14:m>
@@ -13586,7 +13542,7 @@
                   </m:oMath>
                 </a14:m>
                 <a:r>
-                  <a:rPr lang="pt-BR" sz="1600" dirty="0" smtClean="0"/>
+                  <a:rPr lang="pt-BR" sz="1600" dirty="0"/>
                   <a:t>, ..., </a:t>
                 </a:r>
                 <a14:m>
@@ -13646,15 +13602,14 @@
                   </m:oMath>
                 </a14:m>
                 <a:r>
-                  <a:rPr lang="pt-BR" sz="1600" dirty="0" smtClean="0"/>
+                  <a:rPr lang="pt-BR" sz="1600" dirty="0"/>
                   <a:t>]</a:t>
                 </a:r>
-                <a:endParaRPr lang="pt-BR" sz="1600" dirty="0"/>
               </a:p>
             </p:txBody>
           </p:sp>
         </mc:Choice>
-        <mc:Fallback>
+        <mc:Fallback xmlns="">
           <p:sp>
             <p:nvSpPr>
               <p:cNvPr id="23" name="CaixaDeTexto 22"/>
@@ -13693,8 +13648,8 @@
           </p:sp>
         </mc:Fallback>
       </mc:AlternateContent>
-      <mc:AlternateContent xmlns:mc="http://schemas.openxmlformats.org/markup-compatibility/2006">
-        <mc:Choice xmlns:a14="http://schemas.microsoft.com/office/drawing/2010/main" Requires="a14">
+      <mc:AlternateContent xmlns:mc="http://schemas.openxmlformats.org/markup-compatibility/2006" xmlns:a14="http://schemas.microsoft.com/office/drawing/2010/main">
+        <mc:Choice Requires="a14">
           <p:sp>
             <p:nvSpPr>
               <p:cNvPr id="24" name="CaixaDeTexto 23"/>
@@ -13780,7 +13735,7 @@
                   </m:oMath>
                 </a14:m>
                 <a:r>
-                  <a:rPr lang="pt-BR" sz="1600" dirty="0" smtClean="0"/>
+                  <a:rPr lang="pt-BR" sz="1600" dirty="0"/>
                   <a:t>, </a:t>
                 </a:r>
                 <a14:m>
@@ -13840,7 +13795,7 @@
                   </m:oMath>
                 </a14:m>
                 <a:r>
-                  <a:rPr lang="pt-BR" sz="1600" dirty="0" smtClean="0"/>
+                  <a:rPr lang="pt-BR" sz="1600" dirty="0"/>
                   <a:t>, ..., </a:t>
                 </a:r>
                 <a14:m>
@@ -13900,15 +13855,14 @@
                   </m:oMath>
                 </a14:m>
                 <a:r>
-                  <a:rPr lang="pt-BR" sz="1600" dirty="0" smtClean="0"/>
+                  <a:rPr lang="pt-BR" sz="1600" dirty="0"/>
                   <a:t>]</a:t>
                 </a:r>
-                <a:endParaRPr lang="pt-BR" sz="1600" dirty="0"/>
               </a:p>
             </p:txBody>
           </p:sp>
         </mc:Choice>
-        <mc:Fallback>
+        <mc:Fallback xmlns="">
           <p:sp>
             <p:nvSpPr>
               <p:cNvPr id="24" name="CaixaDeTexto 23"/>
@@ -13974,13 +13928,8 @@
             </a:r>
             <a:r>
               <a:rPr lang="pt-BR" sz="1200" dirty="0"/>
-              <a:t> </a:t>
+              <a:t> 1</a:t>
             </a:r>
-            <a:r>
-              <a:rPr lang="pt-BR" sz="1200" dirty="0" smtClean="0"/>
-              <a:t>1</a:t>
-            </a:r>
-            <a:endParaRPr lang="pt-BR" sz="1200" dirty="0"/>
           </a:p>
         </p:txBody>
       </p:sp>
@@ -14011,13 +13960,8 @@
             </a:r>
             <a:r>
               <a:rPr lang="pt-BR" sz="1200" dirty="0"/>
-              <a:t> </a:t>
+              <a:t> 2</a:t>
             </a:r>
-            <a:r>
-              <a:rPr lang="pt-BR" sz="1200" dirty="0" smtClean="0"/>
-              <a:t>2</a:t>
-            </a:r>
-            <a:endParaRPr lang="pt-BR" sz="1200" dirty="0"/>
           </a:p>
         </p:txBody>
       </p:sp>
@@ -14048,13 +13992,8 @@
             </a:r>
             <a:r>
               <a:rPr lang="pt-BR" sz="1200" dirty="0"/>
-              <a:t> </a:t>
+              <a:t> 3</a:t>
             </a:r>
-            <a:r>
-              <a:rPr lang="pt-BR" sz="1200" dirty="0" smtClean="0"/>
-              <a:t>3</a:t>
-            </a:r>
-            <a:endParaRPr lang="pt-BR" sz="1200" dirty="0"/>
           </a:p>
         </p:txBody>
       </p:sp>
@@ -14085,13 +14024,8 @@
             </a:r>
             <a:r>
               <a:rPr lang="pt-BR" sz="1200" dirty="0"/>
-              <a:t> </a:t>
+              <a:t> 4</a:t>
             </a:r>
-            <a:r>
-              <a:rPr lang="pt-BR" sz="1200" dirty="0" smtClean="0"/>
-              <a:t>4</a:t>
-            </a:r>
-            <a:endParaRPr lang="pt-BR" sz="1200" dirty="0"/>
           </a:p>
         </p:txBody>
       </p:sp>
@@ -14119,7 +14053,7 @@
           <a:p>
             <a:pPr algn="ctr"/>
             <a:r>
-              <a:rPr lang="pt-BR" dirty="0" smtClean="0"/>
+              <a:rPr lang="pt-BR" dirty="0"/>
               <a:t>Assembly</a:t>
             </a:r>
           </a:p>
@@ -14129,7 +14063,7 @@
           </a:p>
           <a:p>
             <a:pPr algn="ctr"/>
-            <a:endParaRPr lang="pt-BR" dirty="0" smtClean="0"/>
+            <a:endParaRPr lang="pt-BR" dirty="0"/>
           </a:p>
           <a:p>
             <a:pPr algn="ctr"/>
@@ -14138,15 +14072,14 @@
           <a:p>
             <a:pPr algn="ctr"/>
             <a:r>
-              <a:rPr lang="pt-BR" dirty="0" smtClean="0"/>
+              <a:rPr lang="pt-BR" dirty="0"/>
               <a:t>Prolongamento</a:t>
             </a:r>
-            <a:endParaRPr lang="pt-BR" dirty="0"/>
           </a:p>
         </p:txBody>
       </p:sp>
-      <mc:AlternateContent xmlns:mc="http://schemas.openxmlformats.org/markup-compatibility/2006">
-        <mc:Choice xmlns:a14="http://schemas.microsoft.com/office/drawing/2010/main" Requires="a14">
+      <mc:AlternateContent xmlns:mc="http://schemas.openxmlformats.org/markup-compatibility/2006" xmlns:a14="http://schemas.microsoft.com/office/drawing/2010/main">
+        <mc:Choice Requires="a14">
           <p:sp>
             <p:nvSpPr>
               <p:cNvPr id="30" name="CaixaDeTexto 29"/>
@@ -14219,7 +14152,7 @@
                   </m:oMath>
                 </a14:m>
                 <a:r>
-                  <a:rPr lang="pt-BR" sz="2400" dirty="0" smtClean="0"/>
+                  <a:rPr lang="pt-BR" sz="2400" dirty="0"/>
                   <a:t>,</a:t>
                 </a:r>
                 <a14:m>
@@ -14260,7 +14193,7 @@
                   </m:oMath>
                 </a14:m>
                 <a:r>
-                  <a:rPr lang="pt-BR" sz="2400" dirty="0" smtClean="0"/>
+                  <a:rPr lang="pt-BR" sz="2400" dirty="0"/>
                   <a:t>, ...,</a:t>
                 </a:r>
                 <a14:m>
@@ -14328,15 +14261,14 @@
                   </m:oMath>
                 </a14:m>
                 <a:r>
-                  <a:rPr lang="pt-BR" sz="2400" dirty="0" smtClean="0"/>
+                  <a:rPr lang="pt-BR" sz="2400" dirty="0"/>
                   <a:t>]</a:t>
                 </a:r>
-                <a:endParaRPr lang="pt-BR" sz="2400" dirty="0"/>
               </a:p>
             </p:txBody>
           </p:sp>
         </mc:Choice>
-        <mc:Fallback>
+        <mc:Fallback xmlns="">
           <p:sp>
             <p:nvSpPr>
               <p:cNvPr id="30" name="CaixaDeTexto 29"/>
@@ -14438,15 +14370,14 @@
           <a:lstStyle/>
           <a:p>
             <a:r>
-              <a:rPr lang="pt-BR" dirty="0" smtClean="0"/>
+              <a:rPr lang="pt-BR" dirty="0"/>
               <a:t>Cálculo Operador Grosso</a:t>
             </a:r>
-            <a:endParaRPr lang="pt-BR" dirty="0"/>
           </a:p>
         </p:txBody>
       </p:sp>
-      <mc:AlternateContent xmlns:mc="http://schemas.openxmlformats.org/markup-compatibility/2006">
-        <mc:Choice xmlns:a14="http://schemas.microsoft.com/office/drawing/2010/main" Requires="a14">
+      <mc:AlternateContent xmlns:mc="http://schemas.openxmlformats.org/markup-compatibility/2006" xmlns:a14="http://schemas.microsoft.com/office/drawing/2010/main">
+        <mc:Choice Requires="a14">
           <p:sp>
             <p:nvSpPr>
               <p:cNvPr id="33" name="CaixaDeTexto 32"/>
@@ -14469,6 +14400,7 @@
               </a:bodyPr>
               <a:lstStyle/>
               <a:p>
+                <a:pPr/>
                 <a14:m>
                   <m:oMathPara xmlns:m="http://schemas.openxmlformats.org/officeDocument/2006/math">
                     <m:oMathParaPr>
@@ -14570,7 +14502,7 @@
             </p:txBody>
           </p:sp>
         </mc:Choice>
-        <mc:Fallback>
+        <mc:Fallback xmlns="">
           <p:sp>
             <p:nvSpPr>
               <p:cNvPr id="33" name="CaixaDeTexto 32"/>
@@ -14641,16 +14573,22 @@
       </p:grpSpPr>
       <p:grpSp>
         <p:nvGrpSpPr>
-          <p:cNvPr id="701" name="Grupo 700"/>
+          <p:cNvPr id="3" name="Group 2">
+            <a:extLst>
+              <a:ext uri="{FF2B5EF4-FFF2-40B4-BE49-F238E27FC236}">
+                <a16:creationId xmlns:a16="http://schemas.microsoft.com/office/drawing/2014/main" id="{0A85BE67-DC11-8841-A9A1-860418BE4DDA}"/>
+              </a:ext>
+            </a:extLst>
+          </p:cNvPr>
           <p:cNvGrpSpPr/>
           <p:nvPr/>
         </p:nvGrpSpPr>
         <p:grpSpPr>
           <a:xfrm>
             <a:off x="640080" y="960667"/>
-            <a:ext cx="9305436" cy="4395725"/>
+            <a:ext cx="9515505" cy="4395725"/>
             <a:chOff x="640080" y="960667"/>
-            <a:chExt cx="9305436" cy="4395725"/>
+            <a:chExt cx="9515505" cy="4395725"/>
           </a:xfrm>
         </p:grpSpPr>
         <p:sp>
@@ -15190,10 +15128,9 @@
             <a:p>
               <a:pPr algn="ctr"/>
               <a:r>
-                <a:rPr lang="pt-BR" dirty="0" smtClean="0"/>
+                <a:rPr lang="pt-BR" dirty="0"/>
                 <a:t>...</a:t>
               </a:r>
-              <a:endParaRPr lang="pt-BR" dirty="0"/>
             </a:p>
           </p:txBody>
         </p:sp>
@@ -15694,10 +15631,9 @@
             <a:p>
               <a:pPr algn="ctr"/>
               <a:r>
-                <a:rPr lang="pt-BR" dirty="0" smtClean="0"/>
+                <a:rPr lang="pt-BR" dirty="0"/>
                 <a:t>...</a:t>
               </a:r>
-              <a:endParaRPr lang="pt-BR" dirty="0"/>
             </a:p>
           </p:txBody>
         </p:sp>
@@ -16192,10 +16128,9 @@
             <a:p>
               <a:pPr algn="ctr"/>
               <a:r>
-                <a:rPr lang="pt-BR" dirty="0" smtClean="0"/>
+                <a:rPr lang="pt-BR" dirty="0"/>
                 <a:t>...</a:t>
               </a:r>
-              <a:endParaRPr lang="pt-BR" dirty="0"/>
             </a:p>
           </p:txBody>
         </p:sp>
@@ -16223,10 +16158,9 @@
             <a:p>
               <a:pPr algn="ctr"/>
               <a:r>
-                <a:rPr lang="pt-BR" dirty="0" smtClean="0"/>
+                <a:rPr lang="pt-BR" dirty="0"/>
                 <a:t>...</a:t>
               </a:r>
-              <a:endParaRPr lang="pt-BR" dirty="0"/>
             </a:p>
           </p:txBody>
         </p:sp>
@@ -16254,10 +16188,9 @@
             <a:p>
               <a:pPr algn="ctr"/>
               <a:r>
-                <a:rPr lang="pt-BR" dirty="0" smtClean="0"/>
+                <a:rPr lang="pt-BR" dirty="0"/>
                 <a:t>...</a:t>
               </a:r>
-              <a:endParaRPr lang="pt-BR" dirty="0"/>
             </a:p>
           </p:txBody>
         </p:sp>
@@ -16285,10 +16218,9 @@
             <a:p>
               <a:pPr algn="ctr"/>
               <a:r>
-                <a:rPr lang="pt-BR" dirty="0" smtClean="0"/>
+                <a:rPr lang="pt-BR" dirty="0"/>
                 <a:t>...</a:t>
               </a:r>
-              <a:endParaRPr lang="pt-BR" dirty="0"/>
             </a:p>
           </p:txBody>
         </p:sp>
@@ -16351,10 +16283,9 @@
             <a:lstStyle/>
             <a:p>
               <a:r>
-                <a:rPr lang="pt-BR" sz="1400" dirty="0" smtClean="0"/>
+                <a:rPr lang="pt-BR" sz="1400" dirty="0"/>
                 <a:t>Nó 1</a:t>
               </a:r>
-              <a:endParaRPr lang="pt-BR" sz="1400" dirty="0"/>
             </a:p>
           </p:txBody>
         </p:sp>
@@ -16417,10 +16348,9 @@
             <a:lstStyle/>
             <a:p>
               <a:r>
-                <a:rPr lang="pt-BR" sz="1400" dirty="0" smtClean="0"/>
+                <a:rPr lang="pt-BR" sz="1400" dirty="0"/>
                 <a:t>Nó 2</a:t>
               </a:r>
-              <a:endParaRPr lang="pt-BR" sz="1400" dirty="0"/>
             </a:p>
           </p:txBody>
         </p:sp>
@@ -16483,10 +16413,9 @@
             <a:lstStyle/>
             <a:p>
               <a:r>
-                <a:rPr lang="pt-BR" sz="1400" dirty="0" smtClean="0"/>
+                <a:rPr lang="pt-BR" sz="1400" dirty="0"/>
                 <a:t>Nó 3</a:t>
               </a:r>
-              <a:endParaRPr lang="pt-BR" sz="1400" dirty="0"/>
             </a:p>
           </p:txBody>
         </p:sp>
@@ -16549,10 +16478,9 @@
             <a:lstStyle/>
             <a:p>
               <a:r>
-                <a:rPr lang="pt-BR" sz="1400" dirty="0" smtClean="0"/>
+                <a:rPr lang="pt-BR" sz="1400" dirty="0"/>
                 <a:t>Nó 9</a:t>
               </a:r>
-              <a:endParaRPr lang="pt-BR" sz="1400" dirty="0"/>
             </a:p>
           </p:txBody>
         </p:sp>
@@ -16580,10 +16508,9 @@
             <a:p>
               <a:pPr algn="ctr"/>
               <a:r>
-                <a:rPr lang="pt-BR" dirty="0" smtClean="0"/>
+                <a:rPr lang="pt-BR" dirty="0"/>
                 <a:t>...</a:t>
               </a:r>
-              <a:endParaRPr lang="pt-BR" dirty="0"/>
             </a:p>
           </p:txBody>
         </p:sp>
@@ -16610,10 +16537,9 @@
             <a:lstStyle/>
             <a:p>
               <a:r>
-                <a:rPr lang="pt-BR" sz="1400" dirty="0" smtClean="0"/>
+                <a:rPr lang="pt-BR" sz="1400" dirty="0"/>
                 <a:t>Nó 1</a:t>
               </a:r>
-              <a:endParaRPr lang="pt-BR" sz="1400" dirty="0"/>
             </a:p>
           </p:txBody>
         </p:sp>
@@ -16676,10 +16602,9 @@
             <a:lstStyle/>
             <a:p>
               <a:r>
-                <a:rPr lang="pt-BR" sz="1400" dirty="0" smtClean="0"/>
+                <a:rPr lang="pt-BR" sz="1400" dirty="0"/>
                 <a:t>Nó 2</a:t>
               </a:r>
-              <a:endParaRPr lang="pt-BR" sz="1400" dirty="0"/>
             </a:p>
           </p:txBody>
         </p:sp>
@@ -16706,10 +16631,9 @@
             <a:lstStyle/>
             <a:p>
               <a:r>
-                <a:rPr lang="pt-BR" sz="1400" dirty="0" smtClean="0"/>
+                <a:rPr lang="pt-BR" sz="1400" dirty="0"/>
                 <a:t>Nó 9</a:t>
               </a:r>
-              <a:endParaRPr lang="pt-BR" sz="1400" dirty="0"/>
             </a:p>
           </p:txBody>
         </p:sp>
@@ -16773,6 +16697,7 @@
                 </a:bodyPr>
                 <a:lstStyle/>
                 <a:p>
+                  <a:pPr/>
                   <a14:m>
                     <m:oMathPara xmlns:m="http://schemas.openxmlformats.org/officeDocument/2006/math">
                       <m:oMathParaPr>
@@ -16829,7 +16754,7 @@
                 <a:prstGeom prst="rect">
                   <a:avLst/>
                 </a:prstGeom>
-                <a:blipFill rotWithShape="0">
+                <a:blipFill>
                   <a:blip r:embed="rId2"/>
                   <a:stretch>
                     <a:fillRect/>
@@ -16841,7 +16766,7 @@
                 <a:lstStyle/>
                 <a:p>
                   <a:r>
-                    <a:rPr lang="pt-BR">
+                    <a:rPr lang="en-US">
                       <a:noFill/>
                     </a:rPr>
                     <a:t> </a:t>
@@ -16859,8 +16784,8 @@
           </p:nvSpPr>
           <p:spPr>
             <a:xfrm>
-              <a:off x="5293580" y="2931444"/>
-              <a:ext cx="978946" cy="484898"/>
+              <a:off x="5274837" y="2931444"/>
+              <a:ext cx="1135626" cy="484898"/>
             </a:xfrm>
             <a:prstGeom prst="rightArrow">
               <a:avLst/>
@@ -16899,7 +16824,7 @@
           </p:nvGrpSpPr>
           <p:grpSpPr>
             <a:xfrm>
-              <a:off x="7427355" y="1765965"/>
+              <a:off x="7637424" y="1765965"/>
               <a:ext cx="314036" cy="314036"/>
               <a:chOff x="8170305" y="2481513"/>
               <a:chExt cx="314036" cy="314036"/>
@@ -17033,7 +16958,7 @@
           </p:nvGrpSpPr>
           <p:grpSpPr>
             <a:xfrm>
-              <a:off x="7113319" y="1765965"/>
+              <a:off x="7323388" y="1765965"/>
               <a:ext cx="314036" cy="314036"/>
               <a:chOff x="7544643" y="1649745"/>
               <a:chExt cx="314036" cy="314036"/>
@@ -17164,7 +17089,7 @@
           </p:nvGrpSpPr>
           <p:grpSpPr>
             <a:xfrm>
-              <a:off x="8061923" y="1765965"/>
+              <a:off x="8271992" y="1765965"/>
               <a:ext cx="314036" cy="314036"/>
               <a:chOff x="8170305" y="2481513"/>
               <a:chExt cx="314036" cy="314036"/>
@@ -17298,7 +17223,7 @@
           </p:nvGrpSpPr>
           <p:grpSpPr>
             <a:xfrm>
-              <a:off x="7747887" y="1765965"/>
+              <a:off x="7957956" y="1765965"/>
               <a:ext cx="314036" cy="314036"/>
               <a:chOff x="7544643" y="1649745"/>
               <a:chExt cx="314036" cy="314036"/>
@@ -17429,7 +17354,7 @@
           </p:nvGrpSpPr>
           <p:grpSpPr>
             <a:xfrm>
-              <a:off x="8685906" y="1765965"/>
+              <a:off x="8895975" y="1765965"/>
               <a:ext cx="314036" cy="314036"/>
               <a:chOff x="8170305" y="2481513"/>
               <a:chExt cx="314036" cy="314036"/>
@@ -17563,7 +17488,7 @@
           </p:nvGrpSpPr>
           <p:grpSpPr>
             <a:xfrm>
-              <a:off x="8371870" y="1765965"/>
+              <a:off x="8581939" y="1765965"/>
               <a:ext cx="314036" cy="314036"/>
               <a:chOff x="7544643" y="1649745"/>
               <a:chExt cx="314036" cy="314036"/>
@@ -17694,7 +17619,7 @@
           </p:nvGrpSpPr>
           <p:grpSpPr>
             <a:xfrm>
-              <a:off x="9320474" y="1765965"/>
+              <a:off x="9530543" y="1765965"/>
               <a:ext cx="314036" cy="314036"/>
               <a:chOff x="8170305" y="2481513"/>
               <a:chExt cx="314036" cy="314036"/>
@@ -17828,7 +17753,7 @@
           </p:nvGrpSpPr>
           <p:grpSpPr>
             <a:xfrm>
-              <a:off x="9006438" y="1765965"/>
+              <a:off x="9216507" y="1765965"/>
               <a:ext cx="314036" cy="314036"/>
               <a:chOff x="7544643" y="1649745"/>
               <a:chExt cx="314036" cy="314036"/>
@@ -17959,7 +17884,7 @@
           </p:nvGrpSpPr>
           <p:grpSpPr>
             <a:xfrm>
-              <a:off x="7741390" y="2080001"/>
+              <a:off x="7951459" y="2080001"/>
               <a:ext cx="314036" cy="314036"/>
               <a:chOff x="8170305" y="2481513"/>
               <a:chExt cx="314036" cy="314036"/>
@@ -18093,7 +18018,7 @@
           </p:nvGrpSpPr>
           <p:grpSpPr>
             <a:xfrm>
-              <a:off x="7427354" y="2080001"/>
+              <a:off x="7637423" y="2080001"/>
               <a:ext cx="314036" cy="314036"/>
               <a:chOff x="7544643" y="1649745"/>
               <a:chExt cx="314036" cy="314036"/>
@@ -18224,7 +18149,7 @@
           </p:nvGrpSpPr>
           <p:grpSpPr>
             <a:xfrm>
-              <a:off x="8375958" y="2080001"/>
+              <a:off x="8586027" y="2080001"/>
               <a:ext cx="314036" cy="314036"/>
               <a:chOff x="8170305" y="2481513"/>
               <a:chExt cx="314036" cy="314036"/>
@@ -18358,7 +18283,7 @@
           </p:nvGrpSpPr>
           <p:grpSpPr>
             <a:xfrm>
-              <a:off x="8061922" y="2080001"/>
+              <a:off x="8271991" y="2080001"/>
               <a:ext cx="314036" cy="314036"/>
               <a:chOff x="7544643" y="1649745"/>
               <a:chExt cx="314036" cy="314036"/>
@@ -18489,7 +18414,7 @@
           </p:nvGrpSpPr>
           <p:grpSpPr>
             <a:xfrm>
-              <a:off x="8999941" y="2080001"/>
+              <a:off x="9210010" y="2080001"/>
               <a:ext cx="314036" cy="314036"/>
               <a:chOff x="8170305" y="2481513"/>
               <a:chExt cx="314036" cy="314036"/>
@@ -18623,7 +18548,7 @@
           </p:nvGrpSpPr>
           <p:grpSpPr>
             <a:xfrm>
-              <a:off x="8685905" y="2080001"/>
+              <a:off x="8895974" y="2080001"/>
               <a:ext cx="314036" cy="314036"/>
               <a:chOff x="7544643" y="1649745"/>
               <a:chExt cx="314036" cy="314036"/>
@@ -18754,7 +18679,7 @@
           </p:nvGrpSpPr>
           <p:grpSpPr>
             <a:xfrm>
-              <a:off x="9631334" y="2080001"/>
+              <a:off x="9841403" y="2080001"/>
               <a:ext cx="314036" cy="314036"/>
               <a:chOff x="8170305" y="2481513"/>
               <a:chExt cx="314036" cy="314036"/>
@@ -18888,7 +18813,7 @@
           </p:nvGrpSpPr>
           <p:grpSpPr>
             <a:xfrm>
-              <a:off x="9320473" y="2080001"/>
+              <a:off x="9530542" y="2080001"/>
               <a:ext cx="314036" cy="314036"/>
               <a:chOff x="7544643" y="1649745"/>
               <a:chExt cx="314036" cy="314036"/>
@@ -19019,7 +18944,7 @@
           </p:nvGrpSpPr>
           <p:grpSpPr>
             <a:xfrm>
-              <a:off x="7113246" y="2080001"/>
+              <a:off x="7323315" y="2080001"/>
               <a:ext cx="314036" cy="314036"/>
               <a:chOff x="8170305" y="2481513"/>
               <a:chExt cx="314036" cy="314036"/>
@@ -19153,7 +19078,7 @@
           </p:nvGrpSpPr>
           <p:grpSpPr>
             <a:xfrm>
-              <a:off x="9631480" y="1768274"/>
+              <a:off x="9841549" y="1768274"/>
               <a:ext cx="314036" cy="314036"/>
               <a:chOff x="7544643" y="1649745"/>
               <a:chExt cx="314036" cy="314036"/>
@@ -19284,7 +19209,7 @@
           </p:nvGrpSpPr>
           <p:grpSpPr>
             <a:xfrm>
-              <a:off x="7427354" y="2391727"/>
+              <a:off x="7637423" y="2391727"/>
               <a:ext cx="314036" cy="314036"/>
               <a:chOff x="8170305" y="2481513"/>
               <a:chExt cx="314036" cy="314036"/>
@@ -19418,7 +19343,7 @@
           </p:nvGrpSpPr>
           <p:grpSpPr>
             <a:xfrm>
-              <a:off x="7113318" y="2391727"/>
+              <a:off x="7323387" y="2391727"/>
               <a:ext cx="314036" cy="314036"/>
               <a:chOff x="7544643" y="1649745"/>
               <a:chExt cx="314036" cy="314036"/>
@@ -19549,7 +19474,7 @@
           </p:nvGrpSpPr>
           <p:grpSpPr>
             <a:xfrm>
-              <a:off x="8061922" y="2391727"/>
+              <a:off x="8271991" y="2391727"/>
               <a:ext cx="314036" cy="314036"/>
               <a:chOff x="8170305" y="2481513"/>
               <a:chExt cx="314036" cy="314036"/>
@@ -19683,7 +19608,7 @@
           </p:nvGrpSpPr>
           <p:grpSpPr>
             <a:xfrm>
-              <a:off x="7747886" y="2391727"/>
+              <a:off x="7957955" y="2391727"/>
               <a:ext cx="314036" cy="314036"/>
               <a:chOff x="7544643" y="1649745"/>
               <a:chExt cx="314036" cy="314036"/>
@@ -19814,7 +19739,7 @@
           </p:nvGrpSpPr>
           <p:grpSpPr>
             <a:xfrm>
-              <a:off x="8685905" y="2391727"/>
+              <a:off x="8895974" y="2391727"/>
               <a:ext cx="314036" cy="314036"/>
               <a:chOff x="8170305" y="2481513"/>
               <a:chExt cx="314036" cy="314036"/>
@@ -19948,7 +19873,7 @@
           </p:nvGrpSpPr>
           <p:grpSpPr>
             <a:xfrm>
-              <a:off x="8371869" y="2391727"/>
+              <a:off x="8581938" y="2391727"/>
               <a:ext cx="314036" cy="314036"/>
               <a:chOff x="7544643" y="1649745"/>
               <a:chExt cx="314036" cy="314036"/>
@@ -20079,7 +20004,7 @@
           </p:nvGrpSpPr>
           <p:grpSpPr>
             <a:xfrm>
-              <a:off x="9320473" y="2391727"/>
+              <a:off x="9530542" y="2391727"/>
               <a:ext cx="314036" cy="314036"/>
               <a:chOff x="8170305" y="2481513"/>
               <a:chExt cx="314036" cy="314036"/>
@@ -20213,7 +20138,7 @@
           </p:nvGrpSpPr>
           <p:grpSpPr>
             <a:xfrm>
-              <a:off x="9006437" y="2391727"/>
+              <a:off x="9216506" y="2391727"/>
               <a:ext cx="314036" cy="314036"/>
               <a:chOff x="7544643" y="1649745"/>
               <a:chExt cx="314036" cy="314036"/>
@@ -20344,7 +20269,7 @@
           </p:nvGrpSpPr>
           <p:grpSpPr>
             <a:xfrm>
-              <a:off x="7741389" y="2705763"/>
+              <a:off x="7951458" y="2705763"/>
               <a:ext cx="314036" cy="314036"/>
               <a:chOff x="8170305" y="2481513"/>
               <a:chExt cx="314036" cy="314036"/>
@@ -20478,7 +20403,7 @@
           </p:nvGrpSpPr>
           <p:grpSpPr>
             <a:xfrm>
-              <a:off x="7427353" y="2705763"/>
+              <a:off x="7637422" y="2705763"/>
               <a:ext cx="314036" cy="314036"/>
               <a:chOff x="7544643" y="1649745"/>
               <a:chExt cx="314036" cy="314036"/>
@@ -20609,7 +20534,7 @@
           </p:nvGrpSpPr>
           <p:grpSpPr>
             <a:xfrm>
-              <a:off x="8375957" y="2705763"/>
+              <a:off x="8586026" y="2705763"/>
               <a:ext cx="314036" cy="314036"/>
               <a:chOff x="8170305" y="2481513"/>
               <a:chExt cx="314036" cy="314036"/>
@@ -20743,7 +20668,7 @@
           </p:nvGrpSpPr>
           <p:grpSpPr>
             <a:xfrm>
-              <a:off x="8061921" y="2705763"/>
+              <a:off x="8271990" y="2705763"/>
               <a:ext cx="314036" cy="314036"/>
               <a:chOff x="7544643" y="1649745"/>
               <a:chExt cx="314036" cy="314036"/>
@@ -20874,7 +20799,7 @@
           </p:nvGrpSpPr>
           <p:grpSpPr>
             <a:xfrm>
-              <a:off x="8999940" y="2705763"/>
+              <a:off x="9210009" y="2705763"/>
               <a:ext cx="314036" cy="314036"/>
               <a:chOff x="8170305" y="2481513"/>
               <a:chExt cx="314036" cy="314036"/>
@@ -21008,7 +20933,7 @@
           </p:nvGrpSpPr>
           <p:grpSpPr>
             <a:xfrm>
-              <a:off x="8685904" y="2705763"/>
+              <a:off x="8895973" y="2705763"/>
               <a:ext cx="314036" cy="314036"/>
               <a:chOff x="7544643" y="1649745"/>
               <a:chExt cx="314036" cy="314036"/>
@@ -21139,7 +21064,7 @@
           </p:nvGrpSpPr>
           <p:grpSpPr>
             <a:xfrm>
-              <a:off x="9631333" y="2705763"/>
+              <a:off x="9841402" y="2705763"/>
               <a:ext cx="314036" cy="314036"/>
               <a:chOff x="8170305" y="2481513"/>
               <a:chExt cx="314036" cy="314036"/>
@@ -21273,7 +21198,7 @@
           </p:nvGrpSpPr>
           <p:grpSpPr>
             <a:xfrm>
-              <a:off x="9320472" y="2705763"/>
+              <a:off x="9530541" y="2705763"/>
               <a:ext cx="314036" cy="314036"/>
               <a:chOff x="7544643" y="1649745"/>
               <a:chExt cx="314036" cy="314036"/>
@@ -21404,7 +21329,7 @@
           </p:nvGrpSpPr>
           <p:grpSpPr>
             <a:xfrm>
-              <a:off x="7113245" y="2705763"/>
+              <a:off x="7323314" y="2705763"/>
               <a:ext cx="314036" cy="314036"/>
               <a:chOff x="8170305" y="2481513"/>
               <a:chExt cx="314036" cy="314036"/>
@@ -21538,7 +21463,7 @@
           </p:nvGrpSpPr>
           <p:grpSpPr>
             <a:xfrm>
-              <a:off x="9631479" y="2394036"/>
+              <a:off x="9841548" y="2394036"/>
               <a:ext cx="314036" cy="314036"/>
               <a:chOff x="7544643" y="1649745"/>
               <a:chExt cx="314036" cy="314036"/>
@@ -21669,7 +21594,7 @@
           </p:nvGrpSpPr>
           <p:grpSpPr>
             <a:xfrm>
-              <a:off x="7427281" y="3017488"/>
+              <a:off x="7637350" y="3017488"/>
               <a:ext cx="314036" cy="314036"/>
               <a:chOff x="8170305" y="2481513"/>
               <a:chExt cx="314036" cy="314036"/>
@@ -21803,7 +21728,7 @@
           </p:nvGrpSpPr>
           <p:grpSpPr>
             <a:xfrm>
-              <a:off x="7113245" y="3017488"/>
+              <a:off x="7323314" y="3017488"/>
               <a:ext cx="314036" cy="314036"/>
               <a:chOff x="7544643" y="1649745"/>
               <a:chExt cx="314036" cy="314036"/>
@@ -21934,7 +21859,7 @@
           </p:nvGrpSpPr>
           <p:grpSpPr>
             <a:xfrm>
-              <a:off x="8061849" y="3017488"/>
+              <a:off x="8271918" y="3017488"/>
               <a:ext cx="314036" cy="314036"/>
               <a:chOff x="8170305" y="2481513"/>
               <a:chExt cx="314036" cy="314036"/>
@@ -22068,7 +21993,7 @@
           </p:nvGrpSpPr>
           <p:grpSpPr>
             <a:xfrm>
-              <a:off x="7747813" y="3017488"/>
+              <a:off x="7957882" y="3017488"/>
               <a:ext cx="314036" cy="314036"/>
               <a:chOff x="7544643" y="1649745"/>
               <a:chExt cx="314036" cy="314036"/>
@@ -22199,7 +22124,7 @@
           </p:nvGrpSpPr>
           <p:grpSpPr>
             <a:xfrm>
-              <a:off x="8685832" y="3017488"/>
+              <a:off x="8895901" y="3017488"/>
               <a:ext cx="314036" cy="314036"/>
               <a:chOff x="8170305" y="2481513"/>
               <a:chExt cx="314036" cy="314036"/>
@@ -22333,7 +22258,7 @@
           </p:nvGrpSpPr>
           <p:grpSpPr>
             <a:xfrm>
-              <a:off x="8371796" y="3017488"/>
+              <a:off x="8581865" y="3017488"/>
               <a:ext cx="314036" cy="314036"/>
               <a:chOff x="7544643" y="1649745"/>
               <a:chExt cx="314036" cy="314036"/>
@@ -22464,7 +22389,7 @@
           </p:nvGrpSpPr>
           <p:grpSpPr>
             <a:xfrm>
-              <a:off x="9320400" y="3017488"/>
+              <a:off x="9530469" y="3017488"/>
               <a:ext cx="314036" cy="314036"/>
               <a:chOff x="8170305" y="2481513"/>
               <a:chExt cx="314036" cy="314036"/>
@@ -22598,7 +22523,7 @@
           </p:nvGrpSpPr>
           <p:grpSpPr>
             <a:xfrm>
-              <a:off x="9006364" y="3017488"/>
+              <a:off x="9216433" y="3017488"/>
               <a:ext cx="314036" cy="314036"/>
               <a:chOff x="7544643" y="1649745"/>
               <a:chExt cx="314036" cy="314036"/>
@@ -22729,7 +22654,7 @@
           </p:nvGrpSpPr>
           <p:grpSpPr>
             <a:xfrm>
-              <a:off x="7741316" y="3331524"/>
+              <a:off x="7951385" y="3331524"/>
               <a:ext cx="314036" cy="314036"/>
               <a:chOff x="8170305" y="2481513"/>
               <a:chExt cx="314036" cy="314036"/>
@@ -22863,7 +22788,7 @@
           </p:nvGrpSpPr>
           <p:grpSpPr>
             <a:xfrm>
-              <a:off x="7427280" y="3331524"/>
+              <a:off x="7637349" y="3331524"/>
               <a:ext cx="314036" cy="314036"/>
               <a:chOff x="7544643" y="1649745"/>
               <a:chExt cx="314036" cy="314036"/>
@@ -22994,7 +22919,7 @@
           </p:nvGrpSpPr>
           <p:grpSpPr>
             <a:xfrm>
-              <a:off x="8375884" y="3331524"/>
+              <a:off x="8585953" y="3331524"/>
               <a:ext cx="314036" cy="314036"/>
               <a:chOff x="8170305" y="2481513"/>
               <a:chExt cx="314036" cy="314036"/>
@@ -23128,7 +23053,7 @@
           </p:nvGrpSpPr>
           <p:grpSpPr>
             <a:xfrm>
-              <a:off x="8061848" y="3331524"/>
+              <a:off x="8271917" y="3331524"/>
               <a:ext cx="314036" cy="314036"/>
               <a:chOff x="7544643" y="1649745"/>
               <a:chExt cx="314036" cy="314036"/>
@@ -23259,7 +23184,7 @@
           </p:nvGrpSpPr>
           <p:grpSpPr>
             <a:xfrm>
-              <a:off x="8999867" y="3331524"/>
+              <a:off x="9209936" y="3331524"/>
               <a:ext cx="314036" cy="314036"/>
               <a:chOff x="8170305" y="2481513"/>
               <a:chExt cx="314036" cy="314036"/>
@@ -23393,7 +23318,7 @@
           </p:nvGrpSpPr>
           <p:grpSpPr>
             <a:xfrm>
-              <a:off x="8685831" y="3331524"/>
+              <a:off x="8895900" y="3331524"/>
               <a:ext cx="314036" cy="314036"/>
               <a:chOff x="7544643" y="1649745"/>
               <a:chExt cx="314036" cy="314036"/>
@@ -23524,7 +23449,7 @@
           </p:nvGrpSpPr>
           <p:grpSpPr>
             <a:xfrm>
-              <a:off x="9631260" y="3331524"/>
+              <a:off x="9841329" y="3331524"/>
               <a:ext cx="314036" cy="314036"/>
               <a:chOff x="8170305" y="2481513"/>
               <a:chExt cx="314036" cy="314036"/>
@@ -23658,7 +23583,7 @@
           </p:nvGrpSpPr>
           <p:grpSpPr>
             <a:xfrm>
-              <a:off x="9320399" y="3331524"/>
+              <a:off x="9530468" y="3331524"/>
               <a:ext cx="314036" cy="314036"/>
               <a:chOff x="7544643" y="1649745"/>
               <a:chExt cx="314036" cy="314036"/>
@@ -23789,7 +23714,7 @@
           </p:nvGrpSpPr>
           <p:grpSpPr>
             <a:xfrm>
-              <a:off x="7113172" y="3331524"/>
+              <a:off x="7323241" y="3331524"/>
               <a:ext cx="314036" cy="314036"/>
               <a:chOff x="8170305" y="2481513"/>
               <a:chExt cx="314036" cy="314036"/>
@@ -23923,7 +23848,7 @@
           </p:nvGrpSpPr>
           <p:grpSpPr>
             <a:xfrm>
-              <a:off x="9631406" y="3019797"/>
+              <a:off x="9841475" y="3019797"/>
               <a:ext cx="314036" cy="314036"/>
               <a:chOff x="7544643" y="1649745"/>
               <a:chExt cx="314036" cy="314036"/>
@@ -24054,7 +23979,7 @@
           </p:nvGrpSpPr>
           <p:grpSpPr>
             <a:xfrm>
-              <a:off x="7427281" y="3643248"/>
+              <a:off x="7637350" y="3643248"/>
               <a:ext cx="314036" cy="314036"/>
               <a:chOff x="8170305" y="2481513"/>
               <a:chExt cx="314036" cy="314036"/>
@@ -24188,7 +24113,7 @@
           </p:nvGrpSpPr>
           <p:grpSpPr>
             <a:xfrm>
-              <a:off x="7113245" y="3643248"/>
+              <a:off x="7323314" y="3643248"/>
               <a:ext cx="314036" cy="314036"/>
               <a:chOff x="7544643" y="1649745"/>
               <a:chExt cx="314036" cy="314036"/>
@@ -24319,7 +24244,7 @@
           </p:nvGrpSpPr>
           <p:grpSpPr>
             <a:xfrm>
-              <a:off x="8061849" y="3643248"/>
+              <a:off x="8271918" y="3643248"/>
               <a:ext cx="314036" cy="314036"/>
               <a:chOff x="8170305" y="2481513"/>
               <a:chExt cx="314036" cy="314036"/>
@@ -24453,7 +24378,7 @@
           </p:nvGrpSpPr>
           <p:grpSpPr>
             <a:xfrm>
-              <a:off x="7747813" y="3643248"/>
+              <a:off x="7957882" y="3643248"/>
               <a:ext cx="314036" cy="314036"/>
               <a:chOff x="7544643" y="1649745"/>
               <a:chExt cx="314036" cy="314036"/>
@@ -24584,7 +24509,7 @@
           </p:nvGrpSpPr>
           <p:grpSpPr>
             <a:xfrm>
-              <a:off x="8685832" y="3643248"/>
+              <a:off x="8895901" y="3643248"/>
               <a:ext cx="314036" cy="314036"/>
               <a:chOff x="8170305" y="2481513"/>
               <a:chExt cx="314036" cy="314036"/>
@@ -24718,7 +24643,7 @@
           </p:nvGrpSpPr>
           <p:grpSpPr>
             <a:xfrm>
-              <a:off x="8371796" y="3643248"/>
+              <a:off x="8581865" y="3643248"/>
               <a:ext cx="314036" cy="314036"/>
               <a:chOff x="7544643" y="1649745"/>
               <a:chExt cx="314036" cy="314036"/>
@@ -24849,7 +24774,7 @@
           </p:nvGrpSpPr>
           <p:grpSpPr>
             <a:xfrm>
-              <a:off x="9320400" y="3643248"/>
+              <a:off x="9530469" y="3643248"/>
               <a:ext cx="314036" cy="314036"/>
               <a:chOff x="8170305" y="2481513"/>
               <a:chExt cx="314036" cy="314036"/>
@@ -24983,7 +24908,7 @@
           </p:nvGrpSpPr>
           <p:grpSpPr>
             <a:xfrm>
-              <a:off x="9006364" y="3643248"/>
+              <a:off x="9216433" y="3643248"/>
               <a:ext cx="314036" cy="314036"/>
               <a:chOff x="7544643" y="1649745"/>
               <a:chExt cx="314036" cy="314036"/>
@@ -25114,7 +25039,7 @@
           </p:nvGrpSpPr>
           <p:grpSpPr>
             <a:xfrm>
-              <a:off x="7741316" y="3957284"/>
+              <a:off x="7951385" y="3957284"/>
               <a:ext cx="314036" cy="314036"/>
               <a:chOff x="8170305" y="2481513"/>
               <a:chExt cx="314036" cy="314036"/>
@@ -25248,7 +25173,7 @@
           </p:nvGrpSpPr>
           <p:grpSpPr>
             <a:xfrm>
-              <a:off x="7427280" y="3957284"/>
+              <a:off x="7637349" y="3957284"/>
               <a:ext cx="314036" cy="314036"/>
               <a:chOff x="7544643" y="1649745"/>
               <a:chExt cx="314036" cy="314036"/>
@@ -25379,7 +25304,7 @@
           </p:nvGrpSpPr>
           <p:grpSpPr>
             <a:xfrm>
-              <a:off x="8375884" y="3957284"/>
+              <a:off x="8585953" y="3957284"/>
               <a:ext cx="314036" cy="314036"/>
               <a:chOff x="8170305" y="2481513"/>
               <a:chExt cx="314036" cy="314036"/>
@@ -25513,7 +25438,7 @@
           </p:nvGrpSpPr>
           <p:grpSpPr>
             <a:xfrm>
-              <a:off x="8061848" y="3957284"/>
+              <a:off x="8271917" y="3957284"/>
               <a:ext cx="314036" cy="314036"/>
               <a:chOff x="7544643" y="1649745"/>
               <a:chExt cx="314036" cy="314036"/>
@@ -25644,7 +25569,7 @@
           </p:nvGrpSpPr>
           <p:grpSpPr>
             <a:xfrm>
-              <a:off x="8999867" y="3957284"/>
+              <a:off x="9209936" y="3957284"/>
               <a:ext cx="314036" cy="314036"/>
               <a:chOff x="8170305" y="2481513"/>
               <a:chExt cx="314036" cy="314036"/>
@@ -25778,7 +25703,7 @@
           </p:nvGrpSpPr>
           <p:grpSpPr>
             <a:xfrm>
-              <a:off x="8685831" y="3957284"/>
+              <a:off x="8895900" y="3957284"/>
               <a:ext cx="314036" cy="314036"/>
               <a:chOff x="7544643" y="1649745"/>
               <a:chExt cx="314036" cy="314036"/>
@@ -25909,7 +25834,7 @@
           </p:nvGrpSpPr>
           <p:grpSpPr>
             <a:xfrm>
-              <a:off x="9631260" y="3957284"/>
+              <a:off x="9841329" y="3957284"/>
               <a:ext cx="314036" cy="314036"/>
               <a:chOff x="8170305" y="2481513"/>
               <a:chExt cx="314036" cy="314036"/>
@@ -26043,7 +25968,7 @@
           </p:nvGrpSpPr>
           <p:grpSpPr>
             <a:xfrm>
-              <a:off x="9320399" y="3957284"/>
+              <a:off x="9530468" y="3957284"/>
               <a:ext cx="314036" cy="314036"/>
               <a:chOff x="7544643" y="1649745"/>
               <a:chExt cx="314036" cy="314036"/>
@@ -26174,7 +26099,7 @@
           </p:nvGrpSpPr>
           <p:grpSpPr>
             <a:xfrm>
-              <a:off x="7113172" y="3957284"/>
+              <a:off x="7323241" y="3957284"/>
               <a:ext cx="314036" cy="314036"/>
               <a:chOff x="8170305" y="2481513"/>
               <a:chExt cx="314036" cy="314036"/>
@@ -26308,7 +26233,7 @@
           </p:nvGrpSpPr>
           <p:grpSpPr>
             <a:xfrm>
-              <a:off x="9631406" y="3645557"/>
+              <a:off x="9841475" y="3645557"/>
               <a:ext cx="314036" cy="314036"/>
               <a:chOff x="7544643" y="1649745"/>
               <a:chExt cx="314036" cy="314036"/>
@@ -26439,7 +26364,7 @@
           </p:nvGrpSpPr>
           <p:grpSpPr>
             <a:xfrm>
-              <a:off x="7427280" y="4269010"/>
+              <a:off x="7637349" y="4269010"/>
               <a:ext cx="314036" cy="314036"/>
               <a:chOff x="8170305" y="2481513"/>
               <a:chExt cx="314036" cy="314036"/>
@@ -26573,7 +26498,7 @@
           </p:nvGrpSpPr>
           <p:grpSpPr>
             <a:xfrm>
-              <a:off x="7113244" y="4269010"/>
+              <a:off x="7323313" y="4269010"/>
               <a:ext cx="314036" cy="314036"/>
               <a:chOff x="7544643" y="1649745"/>
               <a:chExt cx="314036" cy="314036"/>
@@ -26704,7 +26629,7 @@
           </p:nvGrpSpPr>
           <p:grpSpPr>
             <a:xfrm>
-              <a:off x="8061848" y="4269010"/>
+              <a:off x="8271917" y="4269010"/>
               <a:ext cx="314036" cy="314036"/>
               <a:chOff x="8170305" y="2481513"/>
               <a:chExt cx="314036" cy="314036"/>
@@ -26838,7 +26763,7 @@
           </p:nvGrpSpPr>
           <p:grpSpPr>
             <a:xfrm>
-              <a:off x="7747812" y="4269010"/>
+              <a:off x="7957881" y="4269010"/>
               <a:ext cx="314036" cy="314036"/>
               <a:chOff x="7544643" y="1649745"/>
               <a:chExt cx="314036" cy="314036"/>
@@ -26969,7 +26894,7 @@
           </p:nvGrpSpPr>
           <p:grpSpPr>
             <a:xfrm>
-              <a:off x="8685831" y="4269010"/>
+              <a:off x="8895900" y="4269010"/>
               <a:ext cx="314036" cy="314036"/>
               <a:chOff x="8170305" y="2481513"/>
               <a:chExt cx="314036" cy="314036"/>
@@ -27103,7 +27028,7 @@
           </p:nvGrpSpPr>
           <p:grpSpPr>
             <a:xfrm>
-              <a:off x="8371795" y="4269010"/>
+              <a:off x="8581864" y="4269010"/>
               <a:ext cx="314036" cy="314036"/>
               <a:chOff x="7544643" y="1649745"/>
               <a:chExt cx="314036" cy="314036"/>
@@ -27234,7 +27159,7 @@
           </p:nvGrpSpPr>
           <p:grpSpPr>
             <a:xfrm>
-              <a:off x="9320399" y="4269010"/>
+              <a:off x="9530468" y="4269010"/>
               <a:ext cx="314036" cy="314036"/>
               <a:chOff x="8170305" y="2481513"/>
               <a:chExt cx="314036" cy="314036"/>
@@ -27368,7 +27293,7 @@
           </p:nvGrpSpPr>
           <p:grpSpPr>
             <a:xfrm>
-              <a:off x="9006363" y="4269010"/>
+              <a:off x="9216432" y="4269010"/>
               <a:ext cx="314036" cy="314036"/>
               <a:chOff x="7544643" y="1649745"/>
               <a:chExt cx="314036" cy="314036"/>
@@ -27499,7 +27424,7 @@
           </p:nvGrpSpPr>
           <p:grpSpPr>
             <a:xfrm>
-              <a:off x="9631405" y="4271319"/>
+              <a:off x="9841474" y="4271319"/>
               <a:ext cx="314036" cy="314036"/>
               <a:chOff x="7544643" y="1649745"/>
               <a:chExt cx="314036" cy="314036"/>
@@ -27632,7 +27557,7 @@
               </p:nvSpPr>
               <p:spPr>
                 <a:xfrm>
-                  <a:off x="8061848" y="4737753"/>
+                  <a:off x="8271917" y="4737753"/>
                   <a:ext cx="904607" cy="595548"/>
                 </a:xfrm>
                 <a:prstGeom prst="rect">
@@ -27646,6 +27571,7 @@
                 </a:bodyPr>
                 <a:lstStyle/>
                 <a:p>
+                  <a:pPr/>
                   <a14:m>
                     <m:oMathPara xmlns:m="http://schemas.openxmlformats.org/officeDocument/2006/math">
                       <m:oMathParaPr>
@@ -27715,13 +27641,13 @@
               </p:nvSpPr>
               <p:spPr>
                 <a:xfrm>
-                  <a:off x="8061848" y="4737753"/>
+                  <a:off x="8271917" y="4737753"/>
                   <a:ext cx="904607" cy="595548"/>
                 </a:xfrm>
                 <a:prstGeom prst="rect">
                   <a:avLst/>
                 </a:prstGeom>
-                <a:blipFill rotWithShape="0">
+                <a:blipFill>
                   <a:blip r:embed="rId3"/>
                   <a:stretch>
                     <a:fillRect/>
@@ -27733,7 +27659,7 @@
                 <a:lstStyle/>
                 <a:p>
                   <a:r>
-                    <a:rPr lang="pt-BR">
+                    <a:rPr lang="en-US">
                       <a:noFill/>
                     </a:rPr>
                     <a:t> </a:t>
@@ -27751,7 +27677,7 @@
           </p:nvSpPr>
           <p:spPr>
             <a:xfrm>
-              <a:off x="6454140" y="1775748"/>
+              <a:off x="6664209" y="1775748"/>
               <a:ext cx="587216" cy="307777"/>
             </a:xfrm>
             <a:prstGeom prst="rect">
@@ -27766,10 +27692,9 @@
             <a:lstStyle/>
             <a:p>
               <a:r>
-                <a:rPr lang="pt-BR" sz="1400" dirty="0" smtClean="0"/>
+                <a:rPr lang="pt-BR" sz="1400" dirty="0"/>
                 <a:t>Nó 1</a:t>
               </a:r>
-              <a:endParaRPr lang="pt-BR" sz="1400" dirty="0"/>
             </a:p>
           </p:txBody>
         </p:sp>
@@ -27781,7 +27706,7 @@
           </p:nvSpPr>
           <p:spPr>
             <a:xfrm>
-              <a:off x="6454140" y="2096343"/>
+              <a:off x="6664209" y="2096343"/>
               <a:ext cx="587216" cy="307777"/>
             </a:xfrm>
             <a:prstGeom prst="rect">
@@ -27796,10 +27721,9 @@
             <a:lstStyle/>
             <a:p>
               <a:r>
-                <a:rPr lang="pt-BR" sz="1400" dirty="0" smtClean="0"/>
+                <a:rPr lang="pt-BR" sz="1400" dirty="0"/>
                 <a:t>Nó 2</a:t>
               </a:r>
-              <a:endParaRPr lang="pt-BR" sz="1400" dirty="0"/>
             </a:p>
           </p:txBody>
         </p:sp>
@@ -27811,7 +27735,7 @@
           </p:nvSpPr>
           <p:spPr>
             <a:xfrm>
-              <a:off x="6454140" y="2412331"/>
+              <a:off x="6664209" y="2412331"/>
               <a:ext cx="587216" cy="307777"/>
             </a:xfrm>
             <a:prstGeom prst="rect">
@@ -27826,10 +27750,9 @@
             <a:lstStyle/>
             <a:p>
               <a:r>
-                <a:rPr lang="pt-BR" sz="1400" dirty="0" smtClean="0"/>
+                <a:rPr lang="pt-BR" sz="1400" dirty="0"/>
                 <a:t>Nó 3</a:t>
               </a:r>
-              <a:endParaRPr lang="pt-BR" sz="1400" dirty="0"/>
             </a:p>
           </p:txBody>
         </p:sp>
@@ -27841,7 +27764,7 @@
           </p:nvSpPr>
           <p:spPr>
             <a:xfrm>
-              <a:off x="6454140" y="2736349"/>
+              <a:off x="6664209" y="2736349"/>
               <a:ext cx="587216" cy="307777"/>
             </a:xfrm>
             <a:prstGeom prst="rect">
@@ -27856,10 +27779,9 @@
             <a:lstStyle/>
             <a:p>
               <a:r>
-                <a:rPr lang="pt-BR" sz="1400" dirty="0" smtClean="0"/>
+                <a:rPr lang="pt-BR" sz="1400" dirty="0"/>
                 <a:t>Nó 4</a:t>
               </a:r>
-              <a:endParaRPr lang="pt-BR" sz="1400" dirty="0"/>
             </a:p>
           </p:txBody>
         </p:sp>
@@ -27871,7 +27793,7 @@
           </p:nvSpPr>
           <p:spPr>
             <a:xfrm>
-              <a:off x="6454140" y="3048490"/>
+              <a:off x="6664209" y="3048490"/>
               <a:ext cx="587216" cy="307777"/>
             </a:xfrm>
             <a:prstGeom prst="rect">
@@ -27886,10 +27808,9 @@
             <a:lstStyle/>
             <a:p>
               <a:r>
-                <a:rPr lang="pt-BR" sz="1400" dirty="0" smtClean="0"/>
+                <a:rPr lang="pt-BR" sz="1400" dirty="0"/>
                 <a:t>Nó 5</a:t>
               </a:r>
-              <a:endParaRPr lang="pt-BR" sz="1400" dirty="0"/>
             </a:p>
           </p:txBody>
         </p:sp>
@@ -27901,7 +27822,7 @@
           </p:nvSpPr>
           <p:spPr>
             <a:xfrm>
-              <a:off x="6454140" y="3351274"/>
+              <a:off x="6664209" y="3351274"/>
               <a:ext cx="587216" cy="307777"/>
             </a:xfrm>
             <a:prstGeom prst="rect">
@@ -27916,10 +27837,9 @@
             <a:lstStyle/>
             <a:p>
               <a:r>
-                <a:rPr lang="pt-BR" sz="1400" dirty="0" smtClean="0"/>
+                <a:rPr lang="pt-BR" sz="1400" dirty="0"/>
                 <a:t>Nó 6</a:t>
               </a:r>
-              <a:endParaRPr lang="pt-BR" sz="1400" dirty="0"/>
             </a:p>
           </p:txBody>
         </p:sp>
@@ -27931,7 +27851,7 @@
           </p:nvSpPr>
           <p:spPr>
             <a:xfrm>
-              <a:off x="6454140" y="3681929"/>
+              <a:off x="6664209" y="3681929"/>
               <a:ext cx="587216" cy="307777"/>
             </a:xfrm>
             <a:prstGeom prst="rect">
@@ -27946,10 +27866,9 @@
             <a:lstStyle/>
             <a:p>
               <a:r>
-                <a:rPr lang="pt-BR" sz="1400" dirty="0" smtClean="0"/>
+                <a:rPr lang="pt-BR" sz="1400" dirty="0"/>
                 <a:t>Nó 7</a:t>
               </a:r>
-              <a:endParaRPr lang="pt-BR" sz="1400" dirty="0"/>
             </a:p>
           </p:txBody>
         </p:sp>
@@ -27961,7 +27880,7 @@
           </p:nvSpPr>
           <p:spPr>
             <a:xfrm>
-              <a:off x="6454140" y="3977032"/>
+              <a:off x="6664209" y="3977032"/>
               <a:ext cx="587216" cy="307777"/>
             </a:xfrm>
             <a:prstGeom prst="rect">
@@ -27976,10 +27895,9 @@
             <a:lstStyle/>
             <a:p>
               <a:r>
-                <a:rPr lang="pt-BR" sz="1400" dirty="0" smtClean="0"/>
+                <a:rPr lang="pt-BR" sz="1400" dirty="0"/>
                 <a:t>Nó 8</a:t>
               </a:r>
-              <a:endParaRPr lang="pt-BR" sz="1400" dirty="0"/>
             </a:p>
           </p:txBody>
         </p:sp>
@@ -27991,7 +27909,7 @@
           </p:nvSpPr>
           <p:spPr>
             <a:xfrm>
-              <a:off x="6454140" y="4301432"/>
+              <a:off x="6664209" y="4301432"/>
               <a:ext cx="587216" cy="307777"/>
             </a:xfrm>
             <a:prstGeom prst="rect">
@@ -28006,10 +27924,9 @@
             <a:lstStyle/>
             <a:p>
               <a:r>
-                <a:rPr lang="pt-BR" sz="1400" dirty="0" smtClean="0"/>
+                <a:rPr lang="pt-BR" sz="1400" dirty="0"/>
                 <a:t>Nó 9</a:t>
               </a:r>
-              <a:endParaRPr lang="pt-BR" sz="1400" dirty="0"/>
             </a:p>
           </p:txBody>
         </p:sp>
@@ -28057,7 +27974,7 @@
           </p:nvSpPr>
           <p:spPr>
             <a:xfrm rot="16200000">
-              <a:off x="6972757" y="1258399"/>
+              <a:off x="7182826" y="1258399"/>
               <a:ext cx="587216" cy="307777"/>
             </a:xfrm>
             <a:prstGeom prst="rect">
@@ -28093,7 +28010,7 @@
           </p:nvSpPr>
           <p:spPr>
             <a:xfrm rot="16200000">
-              <a:off x="7276251" y="1258398"/>
+              <a:off x="7486320" y="1258398"/>
               <a:ext cx="587216" cy="307777"/>
             </a:xfrm>
             <a:prstGeom prst="rect">
@@ -28129,7 +28046,7 @@
           </p:nvSpPr>
           <p:spPr>
             <a:xfrm rot="16200000">
-              <a:off x="7579746" y="1252849"/>
+              <a:off x="7789815" y="1252849"/>
               <a:ext cx="587216" cy="307777"/>
             </a:xfrm>
             <a:prstGeom prst="rect">
@@ -28152,13 +28069,8 @@
             <a:p>
               <a:r>
                 <a:rPr lang="pt-BR" dirty="0"/>
-                <a:t>Nó </a:t>
+                <a:t>Nó 3</a:t>
               </a:r>
-              <a:r>
-                <a:rPr lang="pt-BR" dirty="0" smtClean="0"/>
-                <a:t>3</a:t>
-              </a:r>
-              <a:endParaRPr lang="pt-BR" dirty="0"/>
             </a:p>
           </p:txBody>
         </p:sp>
@@ -28170,7 +28082,7 @@
           </p:nvSpPr>
           <p:spPr>
             <a:xfrm rot="16200000">
-              <a:off x="7911970" y="1258398"/>
+              <a:off x="8122039" y="1258398"/>
               <a:ext cx="587216" cy="307777"/>
             </a:xfrm>
             <a:prstGeom prst="rect">
@@ -28193,13 +28105,8 @@
             <a:p>
               <a:r>
                 <a:rPr lang="pt-BR" dirty="0"/>
-                <a:t>Nó </a:t>
+                <a:t>Nó 4</a:t>
               </a:r>
-              <a:r>
-                <a:rPr lang="pt-BR" dirty="0" smtClean="0"/>
-                <a:t>4</a:t>
-              </a:r>
-              <a:endParaRPr lang="pt-BR" dirty="0"/>
             </a:p>
           </p:txBody>
         </p:sp>
@@ -28211,7 +28118,7 @@
           </p:nvSpPr>
           <p:spPr>
             <a:xfrm rot="16200000">
-              <a:off x="8215464" y="1258397"/>
+              <a:off x="8425533" y="1258397"/>
               <a:ext cx="587216" cy="307777"/>
             </a:xfrm>
             <a:prstGeom prst="rect">
@@ -28234,13 +28141,8 @@
             <a:p>
               <a:r>
                 <a:rPr lang="pt-BR" dirty="0"/>
-                <a:t>Nó </a:t>
+                <a:t>Nó 5</a:t>
               </a:r>
-              <a:r>
-                <a:rPr lang="pt-BR" dirty="0" smtClean="0"/>
-                <a:t>5</a:t>
-              </a:r>
-              <a:endParaRPr lang="pt-BR" dirty="0"/>
             </a:p>
           </p:txBody>
         </p:sp>
@@ -28252,7 +28154,7 @@
           </p:nvSpPr>
           <p:spPr>
             <a:xfrm rot="16200000">
-              <a:off x="8518959" y="1252848"/>
+              <a:off x="8729028" y="1252848"/>
               <a:ext cx="587216" cy="307777"/>
             </a:xfrm>
             <a:prstGeom prst="rect">
@@ -28275,13 +28177,8 @@
             <a:p>
               <a:r>
                 <a:rPr lang="pt-BR" dirty="0"/>
-                <a:t>Nó </a:t>
+                <a:t>Nó 6</a:t>
               </a:r>
-              <a:r>
-                <a:rPr lang="pt-BR" dirty="0" smtClean="0"/>
-                <a:t>6</a:t>
-              </a:r>
-              <a:endParaRPr lang="pt-BR" dirty="0"/>
             </a:p>
           </p:txBody>
         </p:sp>
@@ -28293,7 +28190,7 @@
           </p:nvSpPr>
           <p:spPr>
             <a:xfrm rot="16200000">
-              <a:off x="8815134" y="1252849"/>
+              <a:off x="9025203" y="1252849"/>
               <a:ext cx="587216" cy="307777"/>
             </a:xfrm>
             <a:prstGeom prst="rect">
@@ -28316,13 +28213,8 @@
             <a:p>
               <a:r>
                 <a:rPr lang="pt-BR" dirty="0"/>
-                <a:t>Nó </a:t>
+                <a:t>Nó 7</a:t>
               </a:r>
-              <a:r>
-                <a:rPr lang="pt-BR" dirty="0" smtClean="0"/>
-                <a:t>7</a:t>
-              </a:r>
-              <a:endParaRPr lang="pt-BR" dirty="0"/>
             </a:p>
           </p:txBody>
         </p:sp>
@@ -28334,7 +28226,7 @@
           </p:nvSpPr>
           <p:spPr>
             <a:xfrm rot="16200000">
-              <a:off x="9118628" y="1252848"/>
+              <a:off x="9328697" y="1252848"/>
               <a:ext cx="587216" cy="307777"/>
             </a:xfrm>
             <a:prstGeom prst="rect">
@@ -28357,13 +28249,8 @@
             <a:p>
               <a:r>
                 <a:rPr lang="pt-BR" dirty="0"/>
-                <a:t>Nó </a:t>
+                <a:t>Nó 8</a:t>
               </a:r>
-              <a:r>
-                <a:rPr lang="pt-BR" dirty="0" smtClean="0"/>
-                <a:t>8</a:t>
-              </a:r>
-              <a:endParaRPr lang="pt-BR" dirty="0"/>
             </a:p>
           </p:txBody>
         </p:sp>
@@ -28375,7 +28262,7 @@
           </p:nvSpPr>
           <p:spPr>
             <a:xfrm rot="16200000">
-              <a:off x="9422123" y="1247299"/>
+              <a:off x="9632192" y="1247299"/>
               <a:ext cx="587216" cy="307777"/>
             </a:xfrm>
             <a:prstGeom prst="rect">
@@ -28398,13 +28285,44 @@
             <a:p>
               <a:r>
                 <a:rPr lang="pt-BR" dirty="0"/>
-                <a:t>Nó </a:t>
+                <a:t>Nó 9</a:t>
               </a:r>
+            </a:p>
+          </p:txBody>
+        </p:sp>
+        <p:sp>
+          <p:nvSpPr>
+            <p:cNvPr id="2" name="TextBox 1">
+              <a:extLst>
+                <a:ext uri="{FF2B5EF4-FFF2-40B4-BE49-F238E27FC236}">
+                  <a16:creationId xmlns:a16="http://schemas.microsoft.com/office/drawing/2014/main" id="{77D85349-9181-364E-B5BE-95CBB221C60B}"/>
+                </a:ext>
+              </a:extLst>
+            </p:cNvPr>
+            <p:cNvSpPr txBox="1"/>
+            <p:nvPr/>
+          </p:nvSpPr>
+          <p:spPr>
+            <a:xfrm>
+              <a:off x="5098150" y="2638694"/>
+              <a:ext cx="1519455" cy="369332"/>
+            </a:xfrm>
+            <a:prstGeom prst="rect">
+              <a:avLst/>
+            </a:prstGeom>
+            <a:noFill/>
+          </p:spPr>
+          <p:txBody>
+            <a:bodyPr wrap="none" rtlCol="0">
+              <a:spAutoFit/>
+            </a:bodyPr>
+            <a:lstStyle/>
+            <a:p>
               <a:r>
-                <a:rPr lang="pt-BR" dirty="0" smtClean="0"/>
-                <a:t>9</a:t>
+                <a:rPr lang="en-US" b="1" dirty="0" err="1"/>
+                <a:t>GetSubMatrix</a:t>
               </a:r>
-              <a:endParaRPr lang="pt-BR" dirty="0"/>
+              <a:endParaRPr lang="en-US" b="1" dirty="0"/>
             </a:p>
           </p:txBody>
         </p:sp>

</xml_diff>